<commit_message>
Updated the Summary slide
</commit_message>
<xml_diff>
--- a/Team 5 - Project 2 - Presentation.pptx
+++ b/Team 5 - Project 2 - Presentation.pptx
@@ -7,12 +7,13 @@
   <p:sldIdLst>
     <p:sldId id="256" r:id="rId2"/>
     <p:sldId id="257" r:id="rId3"/>
-    <p:sldId id="264" r:id="rId4"/>
-    <p:sldId id="265" r:id="rId5"/>
-    <p:sldId id="258" r:id="rId6"/>
-    <p:sldId id="259" r:id="rId7"/>
-    <p:sldId id="262" r:id="rId8"/>
-    <p:sldId id="263" r:id="rId9"/>
+    <p:sldId id="266" r:id="rId4"/>
+    <p:sldId id="264" r:id="rId5"/>
+    <p:sldId id="265" r:id="rId6"/>
+    <p:sldId id="258" r:id="rId7"/>
+    <p:sldId id="259" r:id="rId8"/>
+    <p:sldId id="262" r:id="rId9"/>
+    <p:sldId id="263" r:id="rId10"/>
   </p:sldIdLst>
   <p:sldSz cx="12192000" cy="6858000"/>
   <p:notesSz cx="6858000" cy="9144000"/>
@@ -269,7 +270,7 @@
           <a:p>
             <a:fld id="{48A87A34-81AB-432B-8DAE-1953F412C126}" type="datetimeFigureOut">
               <a:rPr lang="en-US" dirty="0"/>
-              <a:t>7/6/24</a:t>
+              <a:t>7/8/24</a:t>
             </a:fld>
             <a:endParaRPr lang="en-US" dirty="0"/>
           </a:p>
@@ -475,7 +476,7 @@
           <a:p>
             <a:fld id="{48A87A34-81AB-432B-8DAE-1953F412C126}" type="datetimeFigureOut">
               <a:rPr lang="en-US" dirty="0"/>
-              <a:t>7/6/24</a:t>
+              <a:t>7/8/24</a:t>
             </a:fld>
             <a:endParaRPr lang="en-US" dirty="0"/>
           </a:p>
@@ -685,7 +686,7 @@
           <a:p>
             <a:fld id="{48A87A34-81AB-432B-8DAE-1953F412C126}" type="datetimeFigureOut">
               <a:rPr lang="en-US" dirty="0"/>
-              <a:t>7/6/24</a:t>
+              <a:t>7/8/24</a:t>
             </a:fld>
             <a:endParaRPr lang="en-US" dirty="0"/>
           </a:p>
@@ -881,7 +882,7 @@
           <a:p>
             <a:fld id="{48A87A34-81AB-432B-8DAE-1953F412C126}" type="datetimeFigureOut">
               <a:rPr lang="en-US" dirty="0"/>
-              <a:t>7/6/24</a:t>
+              <a:t>7/8/24</a:t>
             </a:fld>
             <a:endParaRPr lang="en-US" dirty="0"/>
           </a:p>
@@ -1155,7 +1156,7 @@
           <a:p>
             <a:fld id="{48A87A34-81AB-432B-8DAE-1953F412C126}" type="datetimeFigureOut">
               <a:rPr lang="en-US" dirty="0"/>
-              <a:t>7/6/24</a:t>
+              <a:t>7/8/24</a:t>
             </a:fld>
             <a:endParaRPr lang="en-US" dirty="0"/>
           </a:p>
@@ -1418,7 +1419,7 @@
           <a:p>
             <a:fld id="{48A87A34-81AB-432B-8DAE-1953F412C126}" type="datetimeFigureOut">
               <a:rPr lang="en-US" dirty="0"/>
-              <a:t>7/6/24</a:t>
+              <a:t>7/8/24</a:t>
             </a:fld>
             <a:endParaRPr lang="en-US" dirty="0"/>
           </a:p>
@@ -1829,7 +1830,7 @@
           <a:p>
             <a:fld id="{48A87A34-81AB-432B-8DAE-1953F412C126}" type="datetimeFigureOut">
               <a:rPr lang="en-US" dirty="0"/>
-              <a:t>7/6/24</a:t>
+              <a:t>7/8/24</a:t>
             </a:fld>
             <a:endParaRPr lang="en-US" dirty="0"/>
           </a:p>
@@ -1973,7 +1974,7 @@
           <a:p>
             <a:fld id="{48A87A34-81AB-432B-8DAE-1953F412C126}" type="datetimeFigureOut">
               <a:rPr lang="en-US" dirty="0"/>
-              <a:t>7/6/24</a:t>
+              <a:t>7/8/24</a:t>
             </a:fld>
             <a:endParaRPr lang="en-US" dirty="0"/>
           </a:p>
@@ -2094,7 +2095,7 @@
           <a:p>
             <a:fld id="{48A87A34-81AB-432B-8DAE-1953F412C126}" type="datetimeFigureOut">
               <a:rPr lang="en-US" dirty="0"/>
-              <a:t>7/6/24</a:t>
+              <a:t>7/8/24</a:t>
             </a:fld>
             <a:endParaRPr lang="en-US" dirty="0"/>
           </a:p>
@@ -2340,7 +2341,7 @@
           <a:p>
             <a:fld id="{48A87A34-81AB-432B-8DAE-1953F412C126}" type="datetimeFigureOut">
               <a:rPr lang="en-US" dirty="0"/>
-              <a:t>7/6/24</a:t>
+              <a:t>7/8/24</a:t>
             </a:fld>
             <a:endParaRPr lang="en-US" dirty="0"/>
           </a:p>
@@ -2781,7 +2782,7 @@
             <a:fld id="{48A87A34-81AB-432B-8DAE-1953F412C126}" type="datetimeFigureOut">
               <a:rPr lang="en-US" dirty="0"/>
               <a:pPr/>
-              <a:t>7/6/24</a:t>
+              <a:t>7/8/24</a:t>
             </a:fld>
             <a:endParaRPr lang="en-US" dirty="0"/>
           </a:p>
@@ -3104,7 +3105,7 @@
             <a:fld id="{48A87A34-81AB-432B-8DAE-1953F412C126}" type="datetimeFigureOut">
               <a:rPr lang="en-US" dirty="0"/>
               <a:pPr/>
-              <a:t>7/6/24</a:t>
+              <a:t>7/8/24</a:t>
             </a:fld>
             <a:endParaRPr lang="en-US" dirty="0"/>
           </a:p>
@@ -3224,6 +3225,53 @@
           </a:fontRef>
         </p:style>
       </p:cxnSp>
+      <p:sp>
+        <p:nvSpPr>
+          <p:cNvPr id="11" name="TextBox 10">
+            <a:extLst>
+              <a:ext uri="{FF2B5EF4-FFF2-40B4-BE49-F238E27FC236}">
+                <a16:creationId xmlns:a16="http://schemas.microsoft.com/office/drawing/2014/main" id="{42BBF872-9174-4359-E66D-D96A3E06AF66}"/>
+              </a:ext>
+            </a:extLst>
+          </p:cNvPr>
+          <p:cNvSpPr txBox="1"/>
+          <p:nvPr userDrawn="1">
+            <p:extLst>
+              <p:ext uri="{1162E1C5-73C7-4A58-AE30-91384D911F3F}">
+                <p184:classification xmlns:p184="http://schemas.microsoft.com/office/powerpoint/2018/4/main" val="ftr"/>
+              </p:ext>
+            </p:extLst>
+          </p:nvPr>
+        </p:nvSpPr>
+        <p:spPr>
+          <a:xfrm>
+            <a:off x="11385550" y="6672580"/>
+            <a:ext cx="765175" cy="121920"/>
+          </a:xfrm>
+          <a:prstGeom prst="rect">
+            <a:avLst/>
+          </a:prstGeom>
+        </p:spPr>
+        <p:txBody>
+          <a:bodyPr horzOverflow="overflow" lIns="0" tIns="0" rIns="0" bIns="0">
+            <a:spAutoFit/>
+          </a:bodyPr>
+          <a:lstStyle/>
+          <a:p>
+            <a:pPr algn="l"/>
+            <a:r>
+              <a:rPr lang="en-US" sz="800">
+                <a:solidFill>
+                  <a:srgbClr val="000000"/>
+                </a:solidFill>
+                <a:latin typeface="Calibri" panose="020F0502020204030204" pitchFamily="34" charset="0"/>
+                <a:cs typeface="Calibri" panose="020F0502020204030204" pitchFamily="34" charset="0"/>
+              </a:rPr>
+              <a:t>Cisco Confidential</a:t>
+            </a:r>
+          </a:p>
+        </p:txBody>
+      </p:sp>
     </p:spTree>
   </p:cSld>
   <p:clrMap bg1="lt1" tx1="dk1" bg2="lt2" tx2="dk2" accent1="accent1" accent2="accent2" accent3="accent3" accent4="accent4" accent5="accent5" accent6="accent6" hlink="hlink" folHlink="folHlink"/>
@@ -3700,7 +3748,7 @@
           <a:p>
             <a:r>
               <a:rPr lang="en-US" dirty="0"/>
-              <a:t>Data Collection</a:t>
+              <a:t>Our Project Goal</a:t>
             </a:r>
           </a:p>
         </p:txBody>
@@ -3724,163 +3772,116 @@
         <p:spPr>
           <a:xfrm>
             <a:off x="1451579" y="2015733"/>
-            <a:ext cx="9603275" cy="1972068"/>
+            <a:ext cx="9603275" cy="2988514"/>
           </a:xfrm>
         </p:spPr>
         <p:txBody>
           <a:bodyPr>
-            <a:normAutofit/>
+            <a:normAutofit fontScale="92500" lnSpcReduction="20000"/>
           </a:bodyPr>
           <a:lstStyle/>
           <a:p>
+            <a:pPr marL="0" indent="0">
+              <a:buNone/>
+            </a:pPr>
             <a:r>
               <a:rPr lang="en-US" dirty="0"/>
-              <a:t>Source of data # Multiple Sources </a:t>
-            </a:r>
-          </a:p>
-          <a:p>
-            <a:r>
-              <a:rPr lang="en-US" dirty="0"/>
-              <a:t>Type of Data # Health Symptoms and possible disease type </a:t>
-            </a:r>
-          </a:p>
-          <a:p>
-            <a:r>
-              <a:rPr lang="en-US" dirty="0"/>
-              <a:t>Total number of records # 32168 Records &amp; 154 Columns</a:t>
-            </a:r>
-          </a:p>
-          <a:p>
-            <a:r>
-              <a:rPr lang="en-US" dirty="0"/>
-              <a:t>Preliminary Observations # </a:t>
-            </a:r>
-          </a:p>
-        </p:txBody>
-      </p:sp>
-      <p:sp>
-        <p:nvSpPr>
-          <p:cNvPr id="4" name="TextBox 3">
-            <a:extLst>
-              <a:ext uri="{FF2B5EF4-FFF2-40B4-BE49-F238E27FC236}">
-                <a16:creationId xmlns:a16="http://schemas.microsoft.com/office/drawing/2014/main" id="{CD008C8C-C427-F0F5-0A76-3AB37FBA6061}"/>
-              </a:ext>
-            </a:extLst>
-          </p:cNvPr>
-          <p:cNvSpPr txBox="1"/>
-          <p:nvPr/>
-        </p:nvSpPr>
-        <p:spPr>
-          <a:xfrm>
-            <a:off x="1693333" y="3828577"/>
-            <a:ext cx="6053667" cy="1722203"/>
-          </a:xfrm>
-          <a:prstGeom prst="rect">
-            <a:avLst/>
-          </a:prstGeom>
-          <a:noFill/>
-        </p:spPr>
-        <p:txBody>
-          <a:bodyPr wrap="square" numCol="2" rtlCol="0">
-            <a:spAutoFit/>
-          </a:bodyPr>
-          <a:lstStyle/>
-          <a:p>
-            <a:pPr marL="742950" lvl="1" indent="-285750">
-              <a:lnSpc>
-                <a:spcPct val="150000"/>
-              </a:lnSpc>
-              <a:buFont typeface="Wingdings" pitchFamily="2" charset="2"/>
-              <a:buChar char="Ø"/>
+              <a:t>To design and train a machine learning model that can provide disease prognosis with high accuracy, leveraging the different symptoms. </a:t>
+            </a:r>
+          </a:p>
+          <a:p>
+            <a:pPr marL="0" indent="0">
+              <a:buNone/>
             </a:pPr>
             <a:r>
-              <a:rPr lang="en-US" dirty="0"/>
-              <a:t>Null Handling</a:t>
-            </a:r>
-          </a:p>
-          <a:p>
-            <a:pPr marL="742950" lvl="1" indent="-285750">
-              <a:lnSpc>
-                <a:spcPct val="150000"/>
-              </a:lnSpc>
-              <a:buFont typeface="Wingdings" pitchFamily="2" charset="2"/>
-              <a:buChar char="Ø"/>
+              <a:rPr lang="en-US" b="0" i="0" u="none" strike="noStrike" dirty="0">
+                <a:solidFill>
+                  <a:srgbClr val="1C2B33"/>
+                </a:solidFill>
+                <a:effectLst/>
+                <a:latin typeface="var(--body-font-family)"/>
+              </a:rPr>
+              <a:t>The specific goals are to:</a:t>
+            </a:r>
+            <a:endParaRPr lang="en-US" b="0" i="0" u="none" strike="noStrike" dirty="0">
+              <a:solidFill>
+                <a:srgbClr val="1C2B33"/>
+              </a:solidFill>
+              <a:effectLst/>
+              <a:latin typeface="Helvetica" pitchFamily="2" charset="0"/>
+            </a:endParaRPr>
+          </a:p>
+          <a:p>
+            <a:pPr algn="l">
+              <a:buFont typeface="Arial" panose="020B0604020202020204" pitchFamily="34" charset="0"/>
+              <a:buChar char="•"/>
             </a:pPr>
             <a:r>
-              <a:rPr lang="en-US" dirty="0"/>
-              <a:t>Imputation</a:t>
-            </a:r>
-          </a:p>
-          <a:p>
-            <a:pPr marL="742950" lvl="1" indent="-285750">
-              <a:lnSpc>
-                <a:spcPct val="150000"/>
-              </a:lnSpc>
-              <a:buFont typeface="Wingdings" pitchFamily="2" charset="2"/>
-              <a:buChar char="Ø"/>
+              <a:rPr lang="en-US" b="0" i="0" u="none" strike="noStrike" dirty="0">
+                <a:solidFill>
+                  <a:srgbClr val="1C2B33"/>
+                </a:solidFill>
+                <a:effectLst/>
+                <a:latin typeface="var(--body-font-family)"/>
+              </a:rPr>
+              <a:t>Develop a predictive model that combines data from multiple systems to improve disease prognosis</a:t>
+            </a:r>
+          </a:p>
+          <a:p>
+            <a:pPr algn="l">
+              <a:buFont typeface="Arial" panose="020B0604020202020204" pitchFamily="34" charset="0"/>
+              <a:buChar char="•"/>
             </a:pPr>
             <a:r>
-              <a:rPr lang="en-US" dirty="0"/>
-              <a:t>Data Merging </a:t>
-            </a:r>
-          </a:p>
-          <a:p>
-            <a:pPr marL="742950" lvl="1" indent="-285750">
-              <a:lnSpc>
-                <a:spcPct val="150000"/>
-              </a:lnSpc>
-              <a:buFont typeface="Wingdings" pitchFamily="2" charset="2"/>
-              <a:buChar char="Ø"/>
+              <a:rPr lang="en-US" b="0" i="0" u="none" strike="noStrike" dirty="0">
+                <a:solidFill>
+                  <a:srgbClr val="1C2B33"/>
+                </a:solidFill>
+                <a:effectLst/>
+                <a:latin typeface="var(--body-font-family)"/>
+              </a:rPr>
+              <a:t>Achieve a target accuracy of </a:t>
+            </a:r>
+            <a:r>
+              <a:rPr lang="en-US" b="0" i="0" u="none" strike="noStrike">
+                <a:solidFill>
+                  <a:srgbClr val="1C2B33"/>
+                </a:solidFill>
+                <a:effectLst/>
+                <a:latin typeface="var(--body-font-family)"/>
+              </a:rPr>
+              <a:t>75% or </a:t>
+            </a:r>
+            <a:r>
+              <a:rPr lang="en-US" b="0" i="0" u="none" strike="noStrike" dirty="0">
+                <a:solidFill>
+                  <a:srgbClr val="1C2B33"/>
+                </a:solidFill>
+                <a:effectLst/>
+                <a:latin typeface="var(--body-font-family)"/>
+              </a:rPr>
+              <a:t>higher</a:t>
+            </a:r>
+          </a:p>
+          <a:p>
+            <a:pPr algn="l">
+              <a:buFont typeface="Arial" panose="020B0604020202020204" pitchFamily="34" charset="0"/>
+              <a:buChar char="•"/>
             </a:pPr>
             <a:r>
-              <a:rPr lang="en-US" dirty="0"/>
-              <a:t>Encoding</a:t>
-            </a:r>
-          </a:p>
-          <a:p>
-            <a:pPr marL="742950" lvl="1" indent="-285750">
-              <a:lnSpc>
-                <a:spcPct val="150000"/>
-              </a:lnSpc>
-              <a:buFont typeface="Wingdings" pitchFamily="2" charset="2"/>
-              <a:buChar char="Ø"/>
-            </a:pPr>
-            <a:r>
-              <a:rPr lang="en-US" dirty="0"/>
-              <a:t>Feature Selection</a:t>
-            </a:r>
-          </a:p>
-          <a:p>
-            <a:pPr marL="742950" lvl="1" indent="-285750">
-              <a:lnSpc>
-                <a:spcPct val="150000"/>
-              </a:lnSpc>
-              <a:buFont typeface="Wingdings" pitchFamily="2" charset="2"/>
-              <a:buChar char="Ø"/>
-            </a:pPr>
-            <a:r>
-              <a:rPr lang="en-US" dirty="0"/>
-              <a:t>Transformations</a:t>
-            </a:r>
-          </a:p>
-          <a:p>
-            <a:pPr marL="742950" lvl="1" indent="-285750">
-              <a:lnSpc>
-                <a:spcPct val="150000"/>
-              </a:lnSpc>
-              <a:buFont typeface="Wingdings" pitchFamily="2" charset="2"/>
-              <a:buChar char="Ø"/>
-            </a:pPr>
-            <a:r>
-              <a:rPr lang="en-US" dirty="0"/>
-              <a:t>Drop Records</a:t>
-            </a:r>
-          </a:p>
-          <a:p>
-            <a:pPr lvl="1">
-              <a:lnSpc>
-                <a:spcPct val="150000"/>
-              </a:lnSpc>
+              <a:rPr lang="en-US" b="0" i="0" u="none" strike="noStrike" dirty="0">
+                <a:solidFill>
+                  <a:srgbClr val="1C2B33"/>
+                </a:solidFill>
+                <a:effectLst/>
+                <a:latin typeface="var(--body-font-family)"/>
+              </a:rPr>
+              <a:t>Create a scalable and interpretable model with APIs that can be integrated into clinical decision support systems</a:t>
+            </a:r>
+          </a:p>
+          <a:p>
+            <a:pPr marL="0" indent="0">
+              <a:buNone/>
             </a:pPr>
             <a:endParaRPr lang="en-US" dirty="0"/>
           </a:p>
@@ -4133,6 +4134,250 @@
     </p:spTree>
     <p:extLst>
       <p:ext uri="{BB962C8B-B14F-4D97-AF65-F5344CB8AC3E}">
+        <p14:creationId xmlns:p14="http://schemas.microsoft.com/office/powerpoint/2010/main" val="1956899437"/>
+      </p:ext>
+    </p:extLst>
+  </p:cSld>
+  <p:clrMapOvr>
+    <a:masterClrMapping/>
+  </p:clrMapOvr>
+</p:sld>
+</file>
+
+<file path=ppt/slides/slide4.xml><?xml version="1.0" encoding="utf-8"?>
+<p:sld xmlns:a="http://schemas.openxmlformats.org/drawingml/2006/main" xmlns:r="http://schemas.openxmlformats.org/officeDocument/2006/relationships" xmlns:p="http://schemas.openxmlformats.org/presentationml/2006/main">
+  <p:cSld>
+    <p:spTree>
+      <p:nvGrpSpPr>
+        <p:cNvPr id="1" name=""/>
+        <p:cNvGrpSpPr/>
+        <p:nvPr/>
+      </p:nvGrpSpPr>
+      <p:grpSpPr>
+        <a:xfrm>
+          <a:off x="0" y="0"/>
+          <a:ext cx="0" cy="0"/>
+          <a:chOff x="0" y="0"/>
+          <a:chExt cx="0" cy="0"/>
+        </a:xfrm>
+      </p:grpSpPr>
+      <p:sp>
+        <p:nvSpPr>
+          <p:cNvPr id="2" name="Title 1">
+            <a:extLst>
+              <a:ext uri="{FF2B5EF4-FFF2-40B4-BE49-F238E27FC236}">
+                <a16:creationId xmlns:a16="http://schemas.microsoft.com/office/drawing/2014/main" id="{23DE7C84-7337-DBDD-2A43-AC1A2D9F9CD6}"/>
+              </a:ext>
+            </a:extLst>
+          </p:cNvPr>
+          <p:cNvSpPr>
+            <a:spLocks noGrp="1"/>
+          </p:cNvSpPr>
+          <p:nvPr>
+            <p:ph type="title"/>
+          </p:nvPr>
+        </p:nvSpPr>
+        <p:spPr/>
+        <p:txBody>
+          <a:bodyPr/>
+          <a:lstStyle/>
+          <a:p>
+            <a:r>
+              <a:rPr lang="en-US" dirty="0"/>
+              <a:t>Data Collection</a:t>
+            </a:r>
+          </a:p>
+        </p:txBody>
+      </p:sp>
+      <p:sp>
+        <p:nvSpPr>
+          <p:cNvPr id="3" name="Content Placeholder 2">
+            <a:extLst>
+              <a:ext uri="{FF2B5EF4-FFF2-40B4-BE49-F238E27FC236}">
+                <a16:creationId xmlns:a16="http://schemas.microsoft.com/office/drawing/2014/main" id="{F01B2593-C203-4E2C-C574-DAD2F45EF8AB}"/>
+              </a:ext>
+            </a:extLst>
+          </p:cNvPr>
+          <p:cNvSpPr>
+            <a:spLocks noGrp="1"/>
+          </p:cNvSpPr>
+          <p:nvPr>
+            <p:ph idx="1"/>
+          </p:nvPr>
+        </p:nvSpPr>
+        <p:spPr>
+          <a:xfrm>
+            <a:off x="1451579" y="2015733"/>
+            <a:ext cx="9603275" cy="1972068"/>
+          </a:xfrm>
+        </p:spPr>
+        <p:txBody>
+          <a:bodyPr>
+            <a:normAutofit/>
+          </a:bodyPr>
+          <a:lstStyle/>
+          <a:p>
+            <a:r>
+              <a:rPr lang="en-US" dirty="0"/>
+              <a:t>Source of data # Multiple Sources </a:t>
+            </a:r>
+          </a:p>
+          <a:p>
+            <a:r>
+              <a:rPr lang="en-US" dirty="0"/>
+              <a:t>Type of Data # Health Symptoms and possible disease type </a:t>
+            </a:r>
+          </a:p>
+          <a:p>
+            <a:r>
+              <a:rPr lang="en-US" dirty="0"/>
+              <a:t>Total number of records # 32168 Records &amp; 154 Columns</a:t>
+            </a:r>
+          </a:p>
+          <a:p>
+            <a:r>
+              <a:rPr lang="en-US" dirty="0"/>
+              <a:t>Preliminary Observations # </a:t>
+            </a:r>
+          </a:p>
+        </p:txBody>
+      </p:sp>
+      <p:sp>
+        <p:nvSpPr>
+          <p:cNvPr id="4" name="TextBox 3">
+            <a:extLst>
+              <a:ext uri="{FF2B5EF4-FFF2-40B4-BE49-F238E27FC236}">
+                <a16:creationId xmlns:a16="http://schemas.microsoft.com/office/drawing/2014/main" id="{CD008C8C-C427-F0F5-0A76-3AB37FBA6061}"/>
+              </a:ext>
+            </a:extLst>
+          </p:cNvPr>
+          <p:cNvSpPr txBox="1"/>
+          <p:nvPr/>
+        </p:nvSpPr>
+        <p:spPr>
+          <a:xfrm>
+            <a:off x="1693333" y="3828577"/>
+            <a:ext cx="6053667" cy="1722203"/>
+          </a:xfrm>
+          <a:prstGeom prst="rect">
+            <a:avLst/>
+          </a:prstGeom>
+          <a:noFill/>
+        </p:spPr>
+        <p:txBody>
+          <a:bodyPr wrap="square" numCol="2" rtlCol="0">
+            <a:spAutoFit/>
+          </a:bodyPr>
+          <a:lstStyle/>
+          <a:p>
+            <a:pPr marL="742950" lvl="1" indent="-285750">
+              <a:lnSpc>
+                <a:spcPct val="150000"/>
+              </a:lnSpc>
+              <a:buFont typeface="Wingdings" pitchFamily="2" charset="2"/>
+              <a:buChar char="Ø"/>
+            </a:pPr>
+            <a:r>
+              <a:rPr lang="en-US" dirty="0"/>
+              <a:t>Null Handling</a:t>
+            </a:r>
+          </a:p>
+          <a:p>
+            <a:pPr marL="742950" lvl="1" indent="-285750">
+              <a:lnSpc>
+                <a:spcPct val="150000"/>
+              </a:lnSpc>
+              <a:buFont typeface="Wingdings" pitchFamily="2" charset="2"/>
+              <a:buChar char="Ø"/>
+            </a:pPr>
+            <a:r>
+              <a:rPr lang="en-US" dirty="0"/>
+              <a:t>Imputation</a:t>
+            </a:r>
+          </a:p>
+          <a:p>
+            <a:pPr marL="742950" lvl="1" indent="-285750">
+              <a:lnSpc>
+                <a:spcPct val="150000"/>
+              </a:lnSpc>
+              <a:buFont typeface="Wingdings" pitchFamily="2" charset="2"/>
+              <a:buChar char="Ø"/>
+            </a:pPr>
+            <a:r>
+              <a:rPr lang="en-US" dirty="0"/>
+              <a:t>Data Merging </a:t>
+            </a:r>
+          </a:p>
+          <a:p>
+            <a:pPr marL="742950" lvl="1" indent="-285750">
+              <a:lnSpc>
+                <a:spcPct val="150000"/>
+              </a:lnSpc>
+              <a:buFont typeface="Wingdings" pitchFamily="2" charset="2"/>
+              <a:buChar char="Ø"/>
+            </a:pPr>
+            <a:r>
+              <a:rPr lang="en-US" dirty="0"/>
+              <a:t>Encoding</a:t>
+            </a:r>
+          </a:p>
+          <a:p>
+            <a:pPr marL="742950" lvl="1" indent="-285750">
+              <a:lnSpc>
+                <a:spcPct val="150000"/>
+              </a:lnSpc>
+              <a:buFont typeface="Wingdings" pitchFamily="2" charset="2"/>
+              <a:buChar char="Ø"/>
+            </a:pPr>
+            <a:r>
+              <a:rPr lang="en-US" dirty="0"/>
+              <a:t>Feature Selection</a:t>
+            </a:r>
+          </a:p>
+          <a:p>
+            <a:pPr marL="742950" lvl="1" indent="-285750">
+              <a:lnSpc>
+                <a:spcPct val="150000"/>
+              </a:lnSpc>
+              <a:buFont typeface="Wingdings" pitchFamily="2" charset="2"/>
+              <a:buChar char="Ø"/>
+            </a:pPr>
+            <a:r>
+              <a:rPr lang="en-US" dirty="0"/>
+              <a:t>Transformations</a:t>
+            </a:r>
+          </a:p>
+          <a:p>
+            <a:pPr marL="742950" lvl="1" indent="-285750">
+              <a:lnSpc>
+                <a:spcPct val="150000"/>
+              </a:lnSpc>
+              <a:buFont typeface="Wingdings" pitchFamily="2" charset="2"/>
+              <a:buChar char="Ø"/>
+            </a:pPr>
+            <a:r>
+              <a:rPr lang="en-US" dirty="0"/>
+              <a:t>Drop Records</a:t>
+            </a:r>
+          </a:p>
+          <a:p>
+            <a:pPr marL="742950" lvl="1" indent="-285750">
+              <a:lnSpc>
+                <a:spcPct val="150000"/>
+              </a:lnSpc>
+              <a:buFont typeface="Wingdings" pitchFamily="2" charset="2"/>
+              <a:buChar char="Ø"/>
+            </a:pPr>
+            <a:r>
+              <a:rPr lang="en-US" dirty="0"/>
+              <a:t>Encoding</a:t>
+            </a:r>
+          </a:p>
+        </p:txBody>
+      </p:sp>
+    </p:spTree>
+    <p:extLst>
+      <p:ext uri="{BB962C8B-B14F-4D97-AF65-F5344CB8AC3E}">
         <p14:creationId xmlns:p14="http://schemas.microsoft.com/office/powerpoint/2010/main" val="2864609264"/>
       </p:ext>
     </p:extLst>
@@ -4143,7 +4388,7 @@
 </p:sld>
 </file>
 
-<file path=ppt/slides/slide4.xml><?xml version="1.0" encoding="utf-8"?>
+<file path=ppt/slides/slide5.xml><?xml version="1.0" encoding="utf-8"?>
 <p:sld xmlns:a="http://schemas.openxmlformats.org/drawingml/2006/main" xmlns:r="http://schemas.openxmlformats.org/officeDocument/2006/relationships" xmlns:p="http://schemas.openxmlformats.org/presentationml/2006/main">
   <p:cSld>
     <p:bg>
@@ -5556,7 +5801,7 @@
 </p:sld>
 </file>
 
-<file path=ppt/slides/slide5.xml><?xml version="1.0" encoding="utf-8"?>
+<file path=ppt/slides/slide6.xml><?xml version="1.0" encoding="utf-8"?>
 <p:sld xmlns:a="http://schemas.openxmlformats.org/drawingml/2006/main" xmlns:r="http://schemas.openxmlformats.org/officeDocument/2006/relationships" xmlns:p="http://schemas.openxmlformats.org/presentationml/2006/main">
   <p:cSld>
     <p:spTree>
@@ -5746,7 +5991,7 @@
 </p:sld>
 </file>
 
-<file path=ppt/slides/slide6.xml><?xml version="1.0" encoding="utf-8"?>
+<file path=ppt/slides/slide7.xml><?xml version="1.0" encoding="utf-8"?>
 <p:sld xmlns:a="http://schemas.openxmlformats.org/drawingml/2006/main" xmlns:r="http://schemas.openxmlformats.org/officeDocument/2006/relationships" xmlns:p="http://schemas.openxmlformats.org/presentationml/2006/main">
   <p:cSld>
     <p:spTree>
@@ -5786,15 +6031,7 @@
           <a:p>
             <a:r>
               <a:rPr lang="en-US" dirty="0"/>
-              <a:t>Model Training/</a:t>
-            </a:r>
-            <a:r>
-              <a:rPr lang="en-US" dirty="0" err="1"/>
-              <a:t>TesTing</a:t>
-            </a:r>
-            <a:r>
-              <a:rPr lang="en-US" dirty="0"/>
-              <a:t> &amp; Evaluation</a:t>
+              <a:t>Model Training &amp; Evaluation</a:t>
             </a:r>
           </a:p>
         </p:txBody>
@@ -5822,76 +6059,40 @@
           </a:xfrm>
         </p:spPr>
         <p:txBody>
-          <a:bodyPr>
-            <a:noAutofit/>
-          </a:bodyPr>
-          <a:lstStyle/>
-          <a:p>
-            <a:r>
-              <a:rPr lang="en-US" sz="1600" dirty="0"/>
+          <a:bodyPr/>
+          <a:lstStyle/>
+          <a:p>
+            <a:r>
+              <a:rPr lang="en-US" dirty="0"/>
               <a:t>Models Trained </a:t>
             </a:r>
           </a:p>
           <a:p>
             <a:pPr lvl="1"/>
             <a:r>
-              <a:rPr lang="en-US" sz="1600" dirty="0"/>
+              <a:rPr lang="en-US" dirty="0"/>
               <a:t>Decision Tree</a:t>
             </a:r>
           </a:p>
           <a:p>
             <a:pPr lvl="1"/>
             <a:r>
-              <a:rPr lang="en-US" sz="1600" dirty="0"/>
+              <a:rPr lang="en-US" dirty="0"/>
               <a:t>Random Forest</a:t>
             </a:r>
           </a:p>
           <a:p>
             <a:pPr lvl="1"/>
             <a:r>
-              <a:rPr lang="en-US" sz="1600" dirty="0"/>
-              <a:t>Naive Bayes</a:t>
+              <a:rPr lang="en-US" dirty="0"/>
+              <a:t>Naive Bayes”</a:t>
             </a:r>
           </a:p>
           <a:p>
             <a:pPr lvl="1"/>
             <a:r>
-              <a:rPr lang="en-US" sz="1600" dirty="0"/>
+              <a:rPr lang="en-US" dirty="0"/>
               <a:t>SVC</a:t>
-            </a:r>
-          </a:p>
-          <a:p>
-            <a:pPr lvl="1"/>
-            <a:endParaRPr lang="en-US" sz="1600" dirty="0"/>
-          </a:p>
-          <a:p>
-            <a:pPr lvl="1"/>
-            <a:endParaRPr lang="en-US" sz="1600" dirty="0">
-              <a:solidFill>
-                <a:srgbClr val="FF0000"/>
-              </a:solidFill>
-            </a:endParaRPr>
-          </a:p>
-          <a:p>
-            <a:pPr lvl="1"/>
-            <a:r>
-              <a:rPr lang="en-US" sz="1600" b="1" dirty="0">
-                <a:solidFill>
-                  <a:srgbClr val="FF0000"/>
-                </a:solidFill>
-              </a:rPr>
-              <a:t>Improve the model performance to 75%</a:t>
-            </a:r>
-          </a:p>
-          <a:p>
-            <a:pPr lvl="1"/>
-            <a:r>
-              <a:rPr lang="en-US" sz="1600" b="1" dirty="0">
-                <a:solidFill>
-                  <a:srgbClr val="FF0000"/>
-                </a:solidFill>
-              </a:rPr>
-              <a:t>R-SQUARE</a:t>
             </a:r>
           </a:p>
         </p:txBody>
@@ -5912,14 +6113,14 @@
             <p:ph sz="half" idx="2"/>
             <p:extLst>
               <p:ext uri="{D42A27DB-BD31-4B8C-83A1-F6EECF244321}">
-                <p14:modId xmlns:p14="http://schemas.microsoft.com/office/powerpoint/2010/main" val="2447218182"/>
+                <p14:modId xmlns:p14="http://schemas.microsoft.com/office/powerpoint/2010/main" val="4040356590"/>
               </p:ext>
             </p:extLst>
           </p:nvPr>
         </p:nvGraphicFramePr>
         <p:xfrm>
-          <a:off x="4844142" y="1897596"/>
-          <a:ext cx="7124564" cy="5681472"/>
+          <a:off x="4800601" y="1934953"/>
+          <a:ext cx="6346370" cy="4106440"/>
         </p:xfrm>
         <a:graphic>
           <a:graphicData uri="http://schemas.openxmlformats.org/drawingml/2006/table">
@@ -5928,14 +6129,14 @@
                 <a:tableStyleId>{5C22544A-7EE6-4342-B048-85BDC9FD1C3A}</a:tableStyleId>
               </a:tblPr>
               <a:tblGrid>
-                <a:gridCol w="2144487">
+                <a:gridCol w="1780242">
                   <a:extLst>
                     <a:ext uri="{9D8B030D-6E8A-4147-A177-3AD203B41FA5}">
                       <a16:colId xmlns:a16="http://schemas.microsoft.com/office/drawing/2014/main" val="4146244293"/>
                     </a:ext>
                   </a:extLst>
                 </a:gridCol>
-                <a:gridCol w="4980077">
+                <a:gridCol w="4566128">
                   <a:extLst>
                     <a:ext uri="{9D8B030D-6E8A-4147-A177-3AD203B41FA5}">
                       <a16:colId xmlns:a16="http://schemas.microsoft.com/office/drawing/2014/main" val="3058098281"/>
@@ -5943,7 +6144,7 @@
                   </a:extLst>
                 </a:gridCol>
               </a:tblGrid>
-              <a:tr h="546890">
+              <a:tr h="564418">
                 <a:tc>
                   <a:txBody>
                     <a:bodyPr/>
@@ -5983,7 +6184,7 @@
                   </a:ext>
                 </a:extLst>
               </a:tr>
-              <a:tr h="799451">
+              <a:tr h="825074">
                 <a:tc>
                   <a:txBody>
                     <a:bodyPr/>
@@ -6039,7 +6240,7 @@
                   </a:ext>
                 </a:extLst>
               </a:tr>
-              <a:tr h="799451">
+              <a:tr h="825074">
                 <a:tc>
                   <a:txBody>
                     <a:bodyPr/>
@@ -6095,7 +6296,7 @@
                   </a:ext>
                 </a:extLst>
               </a:tr>
-              <a:tr h="1033670">
+              <a:tr h="825074">
                 <a:tc>
                   <a:txBody>
                     <a:bodyPr/>
@@ -6159,7 +6360,7 @@
                   </a:ext>
                 </a:extLst>
               </a:tr>
-              <a:tr h="799451">
+              <a:tr h="825074">
                 <a:tc>
                   <a:txBody>
                     <a:bodyPr/>
@@ -6215,78 +6416,6 @@
                   </a:ext>
                 </a:extLst>
               </a:tr>
-              <a:tr h="799451">
-                <a:tc>
-                  <a:txBody>
-                    <a:bodyPr/>
-                    <a:lstStyle/>
-                    <a:p>
-                      <a:pPr algn="ctr"/>
-                      <a:r>
-                        <a:rPr lang="en-US" sz="1200" dirty="0">
-                          <a:solidFill>
-                            <a:srgbClr val="FF0000"/>
-                          </a:solidFill>
-                        </a:rPr>
-                        <a:t>K-Nearest Neighbor</a:t>
-                      </a:r>
-                    </a:p>
-                  </a:txBody>
-                  <a:tcPr/>
-                </a:tc>
-                <a:tc>
-                  <a:txBody>
-                    <a:bodyPr/>
-                    <a:lstStyle/>
-                    <a:p>
-                      <a:pPr algn="ctr"/>
-                      <a:endParaRPr lang="en-US" sz="1200" dirty="0"/>
-                    </a:p>
-                  </a:txBody>
-                  <a:tcPr/>
-                </a:tc>
-                <a:extLst>
-                  <a:ext uri="{0D108BD9-81ED-4DB2-BD59-A6C34878D82A}">
-                    <a16:rowId xmlns:a16="http://schemas.microsoft.com/office/drawing/2014/main" val="322618326"/>
-                  </a:ext>
-                </a:extLst>
-              </a:tr>
-              <a:tr h="799451">
-                <a:tc>
-                  <a:txBody>
-                    <a:bodyPr/>
-                    <a:lstStyle/>
-                    <a:p>
-                      <a:pPr algn="ctr"/>
-                      <a:r>
-                        <a:rPr lang="en-US" sz="1200" dirty="0">
-                          <a:solidFill>
-                            <a:srgbClr val="FF0000"/>
-                          </a:solidFill>
-                        </a:rPr>
-                        <a:t>PCS [ Dimension Reduction ]</a:t>
-                      </a:r>
-                    </a:p>
-                  </a:txBody>
-                  <a:tcPr/>
-                </a:tc>
-                <a:tc>
-                  <a:txBody>
-                    <a:bodyPr/>
-                    <a:lstStyle/>
-                    <a:p>
-                      <a:pPr algn="ctr"/>
-                      <a:endParaRPr lang="en-US" sz="1200" dirty="0"/>
-                    </a:p>
-                  </a:txBody>
-                  <a:tcPr/>
-                </a:tc>
-                <a:extLst>
-                  <a:ext uri="{0D108BD9-81ED-4DB2-BD59-A6C34878D82A}">
-                    <a16:rowId xmlns:a16="http://schemas.microsoft.com/office/drawing/2014/main" val="740044493"/>
-                  </a:ext>
-                </a:extLst>
-              </a:tr>
             </a:tbl>
           </a:graphicData>
         </a:graphic>
@@ -6304,7 +6433,7 @@
 </p:sld>
 </file>
 
-<file path=ppt/slides/slide7.xml><?xml version="1.0" encoding="utf-8"?>
+<file path=ppt/slides/slide8.xml><?xml version="1.0" encoding="utf-8"?>
 <p:sld xmlns:a="http://schemas.openxmlformats.org/drawingml/2006/main" xmlns:r="http://schemas.openxmlformats.org/officeDocument/2006/relationships" xmlns:p="http://schemas.openxmlformats.org/presentationml/2006/main">
   <p:cSld>
     <p:spTree>
@@ -6527,7 +6656,7 @@
 </p:sld>
 </file>
 
-<file path=ppt/slides/slide8.xml><?xml version="1.0" encoding="utf-8"?>
+<file path=ppt/slides/slide9.xml><?xml version="1.0" encoding="utf-8"?>
 <p:sld xmlns:a="http://schemas.openxmlformats.org/drawingml/2006/main" xmlns:r="http://schemas.openxmlformats.org/officeDocument/2006/relationships" xmlns:p="http://schemas.openxmlformats.org/presentationml/2006/main">
   <p:cSld>
     <p:spTree>

</xml_diff>

<commit_message>
Updated Slides for the final Presentation
</commit_message>
<xml_diff>
--- a/Team 5 - Project 2 - Presentation.pptx
+++ b/Team 5 - Project 2 - Presentation.pptx
@@ -8,12 +8,11 @@
     <p:sldId id="256" r:id="rId2"/>
     <p:sldId id="257" r:id="rId3"/>
     <p:sldId id="266" r:id="rId4"/>
-    <p:sldId id="264" r:id="rId5"/>
-    <p:sldId id="265" r:id="rId6"/>
-    <p:sldId id="258" r:id="rId7"/>
-    <p:sldId id="259" r:id="rId8"/>
-    <p:sldId id="262" r:id="rId9"/>
-    <p:sldId id="263" r:id="rId10"/>
+    <p:sldId id="265" r:id="rId5"/>
+    <p:sldId id="258" r:id="rId6"/>
+    <p:sldId id="259" r:id="rId7"/>
+    <p:sldId id="262" r:id="rId8"/>
+    <p:sldId id="263" r:id="rId9"/>
   </p:sldIdLst>
   <p:sldSz cx="12192000" cy="6858000"/>
   <p:notesSz cx="6858000" cy="9144000"/>
@@ -3840,27 +3839,7 @@
                 <a:effectLst/>
                 <a:latin typeface="var(--body-font-family)"/>
               </a:rPr>
-              <a:t>Achieve a target accuracy of </a:t>
-            </a:r>
-            <a:r>
-              <a:rPr lang="en-US" b="0" i="0" u="none" strike="noStrike">
-                <a:solidFill>
-                  <a:srgbClr val="1C2B33"/>
-                </a:solidFill>
-                <a:effectLst/>
-                <a:latin typeface="var(--body-font-family)"/>
-              </a:rPr>
-              <a:t>75% or </a:t>
-            </a:r>
-            <a:r>
-              <a:rPr lang="en-US" b="0" i="0" u="none" strike="noStrike" dirty="0">
-                <a:solidFill>
-                  <a:srgbClr val="1C2B33"/>
-                </a:solidFill>
-                <a:effectLst/>
-                <a:latin typeface="var(--body-font-family)"/>
-              </a:rPr>
-              <a:t>higher</a:t>
+              <a:t>Achieve a target accuracy of 75% or higher</a:t>
             </a:r>
           </a:p>
           <a:p>
@@ -3975,25 +3954,25 @@
           <a:p>
             <a:r>
               <a:rPr lang="en-US" dirty="0"/>
-              <a:t>Source of data # Multiple Sources </a:t>
+              <a:t>Source of data : UC Irvine Machine Learning Repository, Kaggle</a:t>
             </a:r>
           </a:p>
           <a:p>
             <a:r>
               <a:rPr lang="en-US" dirty="0"/>
-              <a:t>Type of Data # Health Symptoms and possible disease type </a:t>
+              <a:t>Type of Data : Health Symptoms and possible disease type </a:t>
             </a:r>
           </a:p>
           <a:p>
             <a:r>
               <a:rPr lang="en-US" dirty="0"/>
-              <a:t>Total number of records # 32168 Records &amp; 154 Columns</a:t>
+              <a:t>Total number of records # 32168 Records &amp; 168 Columns</a:t>
             </a:r>
           </a:p>
           <a:p>
             <a:r>
               <a:rPr lang="en-US" dirty="0"/>
-              <a:t>Preliminary Observations # </a:t>
+              <a:t>Preliminary Clean up </a:t>
             </a:r>
           </a:p>
         </p:txBody>
@@ -4012,8 +3991,8 @@
         </p:nvSpPr>
         <p:spPr>
           <a:xfrm>
-            <a:off x="1693333" y="3828577"/>
-            <a:ext cx="6053667" cy="1722203"/>
+            <a:off x="1693332" y="3828577"/>
+            <a:ext cx="6669831" cy="1719468"/>
           </a:xfrm>
           <a:prstGeom prst="rect">
             <a:avLst/>
@@ -4087,7 +4066,7 @@
             </a:pPr>
             <a:r>
               <a:rPr lang="en-US" dirty="0"/>
-              <a:t>Feature Selection</a:t>
+              <a:t>Removing duplicates </a:t>
             </a:r>
           </a:p>
           <a:p>
@@ -4100,7 +4079,7 @@
             </a:pPr>
             <a:r>
               <a:rPr lang="en-US" dirty="0"/>
-              <a:t>Transformations</a:t>
+              <a:t>Removing Irrelevant data</a:t>
             </a:r>
           </a:p>
           <a:p>
@@ -4113,7 +4092,7 @@
             </a:pPr>
             <a:r>
               <a:rPr lang="en-US" dirty="0"/>
-              <a:t>Drop Records</a:t>
+              <a:t>Transformations</a:t>
             </a:r>
           </a:p>
           <a:p>
@@ -4126,7 +4105,7 @@
             </a:pPr>
             <a:r>
               <a:rPr lang="en-US" dirty="0"/>
-              <a:t>Encoding</a:t>
+              <a:t>Data normalization</a:t>
             </a:r>
           </a:p>
         </p:txBody>
@@ -4145,250 +4124,6 @@
 </file>
 
 <file path=ppt/slides/slide4.xml><?xml version="1.0" encoding="utf-8"?>
-<p:sld xmlns:a="http://schemas.openxmlformats.org/drawingml/2006/main" xmlns:r="http://schemas.openxmlformats.org/officeDocument/2006/relationships" xmlns:p="http://schemas.openxmlformats.org/presentationml/2006/main">
-  <p:cSld>
-    <p:spTree>
-      <p:nvGrpSpPr>
-        <p:cNvPr id="1" name=""/>
-        <p:cNvGrpSpPr/>
-        <p:nvPr/>
-      </p:nvGrpSpPr>
-      <p:grpSpPr>
-        <a:xfrm>
-          <a:off x="0" y="0"/>
-          <a:ext cx="0" cy="0"/>
-          <a:chOff x="0" y="0"/>
-          <a:chExt cx="0" cy="0"/>
-        </a:xfrm>
-      </p:grpSpPr>
-      <p:sp>
-        <p:nvSpPr>
-          <p:cNvPr id="2" name="Title 1">
-            <a:extLst>
-              <a:ext uri="{FF2B5EF4-FFF2-40B4-BE49-F238E27FC236}">
-                <a16:creationId xmlns:a16="http://schemas.microsoft.com/office/drawing/2014/main" id="{23DE7C84-7337-DBDD-2A43-AC1A2D9F9CD6}"/>
-              </a:ext>
-            </a:extLst>
-          </p:cNvPr>
-          <p:cNvSpPr>
-            <a:spLocks noGrp="1"/>
-          </p:cNvSpPr>
-          <p:nvPr>
-            <p:ph type="title"/>
-          </p:nvPr>
-        </p:nvSpPr>
-        <p:spPr/>
-        <p:txBody>
-          <a:bodyPr/>
-          <a:lstStyle/>
-          <a:p>
-            <a:r>
-              <a:rPr lang="en-US" dirty="0"/>
-              <a:t>Data Collection</a:t>
-            </a:r>
-          </a:p>
-        </p:txBody>
-      </p:sp>
-      <p:sp>
-        <p:nvSpPr>
-          <p:cNvPr id="3" name="Content Placeholder 2">
-            <a:extLst>
-              <a:ext uri="{FF2B5EF4-FFF2-40B4-BE49-F238E27FC236}">
-                <a16:creationId xmlns:a16="http://schemas.microsoft.com/office/drawing/2014/main" id="{F01B2593-C203-4E2C-C574-DAD2F45EF8AB}"/>
-              </a:ext>
-            </a:extLst>
-          </p:cNvPr>
-          <p:cNvSpPr>
-            <a:spLocks noGrp="1"/>
-          </p:cNvSpPr>
-          <p:nvPr>
-            <p:ph idx="1"/>
-          </p:nvPr>
-        </p:nvSpPr>
-        <p:spPr>
-          <a:xfrm>
-            <a:off x="1451579" y="2015733"/>
-            <a:ext cx="9603275" cy="1972068"/>
-          </a:xfrm>
-        </p:spPr>
-        <p:txBody>
-          <a:bodyPr>
-            <a:normAutofit/>
-          </a:bodyPr>
-          <a:lstStyle/>
-          <a:p>
-            <a:r>
-              <a:rPr lang="en-US" dirty="0"/>
-              <a:t>Source of data # Multiple Sources </a:t>
-            </a:r>
-          </a:p>
-          <a:p>
-            <a:r>
-              <a:rPr lang="en-US" dirty="0"/>
-              <a:t>Type of Data # Health Symptoms and possible disease type </a:t>
-            </a:r>
-          </a:p>
-          <a:p>
-            <a:r>
-              <a:rPr lang="en-US" dirty="0"/>
-              <a:t>Total number of records # 32168 Records &amp; 154 Columns</a:t>
-            </a:r>
-          </a:p>
-          <a:p>
-            <a:r>
-              <a:rPr lang="en-US" dirty="0"/>
-              <a:t>Preliminary Observations # </a:t>
-            </a:r>
-          </a:p>
-        </p:txBody>
-      </p:sp>
-      <p:sp>
-        <p:nvSpPr>
-          <p:cNvPr id="4" name="TextBox 3">
-            <a:extLst>
-              <a:ext uri="{FF2B5EF4-FFF2-40B4-BE49-F238E27FC236}">
-                <a16:creationId xmlns:a16="http://schemas.microsoft.com/office/drawing/2014/main" id="{CD008C8C-C427-F0F5-0A76-3AB37FBA6061}"/>
-              </a:ext>
-            </a:extLst>
-          </p:cNvPr>
-          <p:cNvSpPr txBox="1"/>
-          <p:nvPr/>
-        </p:nvSpPr>
-        <p:spPr>
-          <a:xfrm>
-            <a:off x="1693333" y="3828577"/>
-            <a:ext cx="6053667" cy="1722203"/>
-          </a:xfrm>
-          <a:prstGeom prst="rect">
-            <a:avLst/>
-          </a:prstGeom>
-          <a:noFill/>
-        </p:spPr>
-        <p:txBody>
-          <a:bodyPr wrap="square" numCol="2" rtlCol="0">
-            <a:spAutoFit/>
-          </a:bodyPr>
-          <a:lstStyle/>
-          <a:p>
-            <a:pPr marL="742950" lvl="1" indent="-285750">
-              <a:lnSpc>
-                <a:spcPct val="150000"/>
-              </a:lnSpc>
-              <a:buFont typeface="Wingdings" pitchFamily="2" charset="2"/>
-              <a:buChar char="Ø"/>
-            </a:pPr>
-            <a:r>
-              <a:rPr lang="en-US" dirty="0"/>
-              <a:t>Null Handling</a:t>
-            </a:r>
-          </a:p>
-          <a:p>
-            <a:pPr marL="742950" lvl="1" indent="-285750">
-              <a:lnSpc>
-                <a:spcPct val="150000"/>
-              </a:lnSpc>
-              <a:buFont typeface="Wingdings" pitchFamily="2" charset="2"/>
-              <a:buChar char="Ø"/>
-            </a:pPr>
-            <a:r>
-              <a:rPr lang="en-US" dirty="0"/>
-              <a:t>Imputation</a:t>
-            </a:r>
-          </a:p>
-          <a:p>
-            <a:pPr marL="742950" lvl="1" indent="-285750">
-              <a:lnSpc>
-                <a:spcPct val="150000"/>
-              </a:lnSpc>
-              <a:buFont typeface="Wingdings" pitchFamily="2" charset="2"/>
-              <a:buChar char="Ø"/>
-            </a:pPr>
-            <a:r>
-              <a:rPr lang="en-US" dirty="0"/>
-              <a:t>Data Merging </a:t>
-            </a:r>
-          </a:p>
-          <a:p>
-            <a:pPr marL="742950" lvl="1" indent="-285750">
-              <a:lnSpc>
-                <a:spcPct val="150000"/>
-              </a:lnSpc>
-              <a:buFont typeface="Wingdings" pitchFamily="2" charset="2"/>
-              <a:buChar char="Ø"/>
-            </a:pPr>
-            <a:r>
-              <a:rPr lang="en-US" dirty="0"/>
-              <a:t>Encoding</a:t>
-            </a:r>
-          </a:p>
-          <a:p>
-            <a:pPr marL="742950" lvl="1" indent="-285750">
-              <a:lnSpc>
-                <a:spcPct val="150000"/>
-              </a:lnSpc>
-              <a:buFont typeface="Wingdings" pitchFamily="2" charset="2"/>
-              <a:buChar char="Ø"/>
-            </a:pPr>
-            <a:r>
-              <a:rPr lang="en-US" dirty="0"/>
-              <a:t>Feature Selection</a:t>
-            </a:r>
-          </a:p>
-          <a:p>
-            <a:pPr marL="742950" lvl="1" indent="-285750">
-              <a:lnSpc>
-                <a:spcPct val="150000"/>
-              </a:lnSpc>
-              <a:buFont typeface="Wingdings" pitchFamily="2" charset="2"/>
-              <a:buChar char="Ø"/>
-            </a:pPr>
-            <a:r>
-              <a:rPr lang="en-US" dirty="0"/>
-              <a:t>Transformations</a:t>
-            </a:r>
-          </a:p>
-          <a:p>
-            <a:pPr marL="742950" lvl="1" indent="-285750">
-              <a:lnSpc>
-                <a:spcPct val="150000"/>
-              </a:lnSpc>
-              <a:buFont typeface="Wingdings" pitchFamily="2" charset="2"/>
-              <a:buChar char="Ø"/>
-            </a:pPr>
-            <a:r>
-              <a:rPr lang="en-US" dirty="0"/>
-              <a:t>Drop Records</a:t>
-            </a:r>
-          </a:p>
-          <a:p>
-            <a:pPr marL="742950" lvl="1" indent="-285750">
-              <a:lnSpc>
-                <a:spcPct val="150000"/>
-              </a:lnSpc>
-              <a:buFont typeface="Wingdings" pitchFamily="2" charset="2"/>
-              <a:buChar char="Ø"/>
-            </a:pPr>
-            <a:r>
-              <a:rPr lang="en-US" dirty="0"/>
-              <a:t>Encoding</a:t>
-            </a:r>
-          </a:p>
-        </p:txBody>
-      </p:sp>
-    </p:spTree>
-    <p:extLst>
-      <p:ext uri="{BB962C8B-B14F-4D97-AF65-F5344CB8AC3E}">
-        <p14:creationId xmlns:p14="http://schemas.microsoft.com/office/powerpoint/2010/main" val="2864609264"/>
-      </p:ext>
-    </p:extLst>
-  </p:cSld>
-  <p:clrMapOvr>
-    <a:masterClrMapping/>
-  </p:clrMapOvr>
-</p:sld>
-</file>
-
-<file path=ppt/slides/slide5.xml><?xml version="1.0" encoding="utf-8"?>
 <p:sld xmlns:a="http://schemas.openxmlformats.org/drawingml/2006/main" xmlns:r="http://schemas.openxmlformats.org/officeDocument/2006/relationships" xmlns:p="http://schemas.openxmlformats.org/presentationml/2006/main">
   <p:cSld>
     <p:bg>
@@ -4494,6 +4229,13 @@
             <a:schemeClr val="lt1"/>
           </a:fontRef>
         </p:style>
+        <p:txBody>
+          <a:bodyPr/>
+          <a:lstStyle/>
+          <a:p>
+            <a:endParaRPr lang="en-US"/>
+          </a:p>
+        </p:txBody>
       </p:sp>
       <p:pic>
         <p:nvPicPr>
@@ -5801,7 +5543,7 @@
 </p:sld>
 </file>
 
-<file path=ppt/slides/slide6.xml><?xml version="1.0" encoding="utf-8"?>
+<file path=ppt/slides/slide5.xml><?xml version="1.0" encoding="utf-8"?>
 <p:sld xmlns:a="http://schemas.openxmlformats.org/drawingml/2006/main" xmlns:r="http://schemas.openxmlformats.org/officeDocument/2006/relationships" xmlns:p="http://schemas.openxmlformats.org/presentationml/2006/main">
   <p:cSld>
     <p:spTree>
@@ -5991,7 +5733,7 @@
 </p:sld>
 </file>
 
-<file path=ppt/slides/slide7.xml><?xml version="1.0" encoding="utf-8"?>
+<file path=ppt/slides/slide6.xml><?xml version="1.0" encoding="utf-8"?>
 <p:sld xmlns:a="http://schemas.openxmlformats.org/drawingml/2006/main" xmlns:r="http://schemas.openxmlformats.org/officeDocument/2006/relationships" xmlns:p="http://schemas.openxmlformats.org/presentationml/2006/main">
   <p:cSld>
     <p:spTree>
@@ -6433,7 +6175,7 @@
 </p:sld>
 </file>
 
-<file path=ppt/slides/slide8.xml><?xml version="1.0" encoding="utf-8"?>
+<file path=ppt/slides/slide7.xml><?xml version="1.0" encoding="utf-8"?>
 <p:sld xmlns:a="http://schemas.openxmlformats.org/drawingml/2006/main" xmlns:r="http://schemas.openxmlformats.org/officeDocument/2006/relationships" xmlns:p="http://schemas.openxmlformats.org/presentationml/2006/main">
   <p:cSld>
     <p:spTree>
@@ -6656,7 +6398,7 @@
 </p:sld>
 </file>
 
-<file path=ppt/slides/slide9.xml><?xml version="1.0" encoding="utf-8"?>
+<file path=ppt/slides/slide8.xml><?xml version="1.0" encoding="utf-8"?>
 <p:sld xmlns:a="http://schemas.openxmlformats.org/drawingml/2006/main" xmlns:r="http://schemas.openxmlformats.org/officeDocument/2006/relationships" xmlns:p="http://schemas.openxmlformats.org/presentationml/2006/main">
   <p:cSld>
     <p:spTree>

</xml_diff>

<commit_message>
Team 5 - Project 2 - Presentation.pptx
</commit_message>
<xml_diff>
--- a/Team 5 - Project 2 - Presentation.pptx
+++ b/Team 5 - Project 2 - Presentation.pptx
@@ -11,8 +11,10 @@
     <p:sldId id="265" r:id="rId5"/>
     <p:sldId id="258" r:id="rId6"/>
     <p:sldId id="259" r:id="rId7"/>
-    <p:sldId id="262" r:id="rId8"/>
-    <p:sldId id="263" r:id="rId9"/>
+    <p:sldId id="267" r:id="rId8"/>
+    <p:sldId id="262" r:id="rId9"/>
+    <p:sldId id="268" r:id="rId10"/>
+    <p:sldId id="263" r:id="rId11"/>
   </p:sldIdLst>
   <p:sldSz cx="12192000" cy="6858000"/>
   <p:notesSz cx="6858000" cy="9144000"/>
@@ -114,7 +116,7 @@
   <p:extLst>
     <p:ext uri="{EFAFB233-063F-42B5-8137-9DF3F51BA10A}">
       <p15:sldGuideLst xmlns:p15="http://schemas.microsoft.com/office/powerpoint/2012/main">
-        <p15:guide id="1" orient="horz" pos="2160" userDrawn="1">
+        <p15:guide id="1" orient="horz" pos="2184" userDrawn="1">
           <p15:clr>
             <a:srgbClr val="A4A3A4"/>
           </p15:clr>
@@ -3652,13 +3654,21 @@
         <p:spPr/>
         <p:txBody>
           <a:bodyPr>
-            <a:normAutofit fontScale="90000"/>
+            <a:normAutofit/>
           </a:bodyPr>
           <a:lstStyle/>
           <a:p>
             <a:r>
               <a:rPr lang="en-US" dirty="0"/>
-              <a:t>Team 5 – Decease Prediction given the symptoms</a:t>
+              <a:t>Team 5 – </a:t>
+            </a:r>
+            <a:r>
+              <a:rPr lang="en-US" dirty="0" err="1"/>
+              <a:t>DISease</a:t>
+            </a:r>
+            <a:r>
+              <a:rPr lang="en-US" dirty="0"/>
+              <a:t> PROGNOSIS MODEL</a:t>
             </a:r>
           </a:p>
         </p:txBody>
@@ -3679,15 +3689,71 @@
             <p:ph type="subTitle" idx="1"/>
           </p:nvPr>
         </p:nvSpPr>
-        <p:spPr/>
-        <p:txBody>
-          <a:bodyPr/>
+        <p:spPr>
+          <a:xfrm>
+            <a:off x="2417780" y="3531204"/>
+            <a:ext cx="8637072" cy="1518968"/>
+          </a:xfrm>
+        </p:spPr>
+        <p:txBody>
+          <a:bodyPr>
+            <a:normAutofit fontScale="85000" lnSpcReduction="20000"/>
+          </a:bodyPr>
           <a:lstStyle/>
           <a:p>
             <a:r>
               <a:rPr lang="en-US" dirty="0"/>
               <a:t>Team Members #</a:t>
             </a:r>
+          </a:p>
+          <a:p>
+            <a:pPr marL="285750" indent="-285750">
+              <a:buFont typeface="Wingdings" pitchFamily="2" charset="2"/>
+              <a:buChar char="Ø"/>
+            </a:pPr>
+            <a:r>
+              <a:rPr lang="en-US" dirty="0" err="1"/>
+              <a:t>Sravya</a:t>
+            </a:r>
+            <a:r>
+              <a:rPr lang="en-US" dirty="0"/>
+              <a:t> </a:t>
+            </a:r>
+            <a:r>
+              <a:rPr lang="en-US" dirty="0" err="1"/>
+              <a:t>kottisa</a:t>
+            </a:r>
+            <a:endParaRPr lang="en-US" dirty="0"/>
+          </a:p>
+          <a:p>
+            <a:pPr marL="285750" indent="-285750">
+              <a:buFont typeface="Wingdings" pitchFamily="2" charset="2"/>
+              <a:buChar char="Ø"/>
+            </a:pPr>
+            <a:r>
+              <a:rPr lang="en-US" dirty="0"/>
+              <a:t>Chris </a:t>
+            </a:r>
+            <a:r>
+              <a:rPr lang="en-US" dirty="0" err="1"/>
+              <a:t>bolger</a:t>
+            </a:r>
+            <a:endParaRPr lang="en-US" dirty="0"/>
+          </a:p>
+          <a:p>
+            <a:pPr marL="285750" indent="-285750">
+              <a:buFont typeface="Wingdings" pitchFamily="2" charset="2"/>
+              <a:buChar char="Ø"/>
+            </a:pPr>
+            <a:r>
+              <a:rPr lang="en-US" dirty="0"/>
+              <a:t>Rajesh </a:t>
+            </a:r>
+            <a:r>
+              <a:rPr lang="en-US" dirty="0" err="1"/>
+              <a:t>velamala</a:t>
+            </a:r>
+            <a:endParaRPr lang="en-US" dirty="0"/>
           </a:p>
           <a:p>
             <a:endParaRPr lang="en-US" dirty="0"/>
@@ -3698,6 +3764,105 @@
     <p:extLst>
       <p:ext uri="{BB962C8B-B14F-4D97-AF65-F5344CB8AC3E}">
         <p14:creationId xmlns:p14="http://schemas.microsoft.com/office/powerpoint/2010/main" val="2950852638"/>
+      </p:ext>
+    </p:extLst>
+  </p:cSld>
+  <p:clrMapOvr>
+    <a:masterClrMapping/>
+  </p:clrMapOvr>
+</p:sld>
+</file>
+
+<file path=ppt/slides/slide10.xml><?xml version="1.0" encoding="utf-8"?>
+<p:sld xmlns:a="http://schemas.openxmlformats.org/drawingml/2006/main" xmlns:r="http://schemas.openxmlformats.org/officeDocument/2006/relationships" xmlns:p="http://schemas.openxmlformats.org/presentationml/2006/main">
+  <p:cSld>
+    <p:spTree>
+      <p:nvGrpSpPr>
+        <p:cNvPr id="1" name=""/>
+        <p:cNvGrpSpPr/>
+        <p:nvPr/>
+      </p:nvGrpSpPr>
+      <p:grpSpPr>
+        <a:xfrm>
+          <a:off x="0" y="0"/>
+          <a:ext cx="0" cy="0"/>
+          <a:chOff x="0" y="0"/>
+          <a:chExt cx="0" cy="0"/>
+        </a:xfrm>
+      </p:grpSpPr>
+      <p:sp>
+        <p:nvSpPr>
+          <p:cNvPr id="2" name="Title 1">
+            <a:extLst>
+              <a:ext uri="{FF2B5EF4-FFF2-40B4-BE49-F238E27FC236}">
+                <a16:creationId xmlns:a16="http://schemas.microsoft.com/office/drawing/2014/main" id="{80F0CDE1-B507-D437-02EF-687206CE56EE}"/>
+              </a:ext>
+            </a:extLst>
+          </p:cNvPr>
+          <p:cNvSpPr>
+            <a:spLocks noGrp="1"/>
+          </p:cNvSpPr>
+          <p:nvPr>
+            <p:ph type="title"/>
+          </p:nvPr>
+        </p:nvSpPr>
+        <p:spPr/>
+        <p:txBody>
+          <a:bodyPr/>
+          <a:lstStyle/>
+          <a:p>
+            <a:r>
+              <a:rPr lang="en-US" dirty="0"/>
+              <a:t>Demo</a:t>
+            </a:r>
+          </a:p>
+        </p:txBody>
+      </p:sp>
+      <p:sp>
+        <p:nvSpPr>
+          <p:cNvPr id="4" name="Content Placeholder 3">
+            <a:extLst>
+              <a:ext uri="{FF2B5EF4-FFF2-40B4-BE49-F238E27FC236}">
+                <a16:creationId xmlns:a16="http://schemas.microsoft.com/office/drawing/2014/main" id="{FBFAE4F4-6D77-E64D-B32F-3B861857DC91}"/>
+              </a:ext>
+            </a:extLst>
+          </p:cNvPr>
+          <p:cNvSpPr>
+            <a:spLocks noGrp="1"/>
+          </p:cNvSpPr>
+          <p:nvPr>
+            <p:ph sz="half" idx="2"/>
+          </p:nvPr>
+        </p:nvSpPr>
+        <p:spPr>
+          <a:xfrm>
+            <a:off x="1449217" y="2017343"/>
+            <a:ext cx="9609706" cy="3441520"/>
+          </a:xfrm>
+        </p:spPr>
+        <p:txBody>
+          <a:bodyPr>
+            <a:normAutofit/>
+          </a:bodyPr>
+          <a:lstStyle/>
+          <a:p>
+            <a:pPr marL="0" indent="0" algn="ctr">
+              <a:lnSpc>
+                <a:spcPct val="200000"/>
+              </a:lnSpc>
+              <a:buNone/>
+            </a:pPr>
+            <a:r>
+              <a:rPr lang="en-US" sz="4400" b="1" dirty="0"/>
+              <a:t>THANK YOU </a:t>
+            </a:r>
+          </a:p>
+        </p:txBody>
+      </p:sp>
+    </p:spTree>
+    <p:extLst>
+      <p:ext uri="{BB962C8B-B14F-4D97-AF65-F5344CB8AC3E}">
+        <p14:creationId xmlns:p14="http://schemas.microsoft.com/office/powerpoint/2010/main" val="2814617537"/>
       </p:ext>
     </p:extLst>
   </p:cSld>
@@ -3954,7 +4119,7 @@
           <a:p>
             <a:r>
               <a:rPr lang="en-US" dirty="0"/>
-              <a:t>Source of data : UC Irvine Machine Learning Repository, Kaggle</a:t>
+              <a:t>Source of data : UC Irvine Machine Learning Repository, Kaggle ( Readme file )</a:t>
             </a:r>
           </a:p>
           <a:p>
@@ -4166,10 +4331,10 @@
       </p:grpSpPr>
       <p:sp>
         <p:nvSpPr>
-          <p:cNvPr id="61" name="Rectangle 41">
+          <p:cNvPr id="153" name="Rectangle 152">
             <a:extLst>
               <a:ext uri="{FF2B5EF4-FFF2-40B4-BE49-F238E27FC236}">
-                <a16:creationId xmlns:a16="http://schemas.microsoft.com/office/drawing/2014/main" id="{785F1D78-FD9F-4432-B90E-00D863D4F315}"/>
+                <a16:creationId xmlns:a16="http://schemas.microsoft.com/office/drawing/2014/main" id="{EEA869E1-F851-4A52-92F5-77E592B76A5B}"/>
               </a:ext>
               <a:ext uri="{C183D7F6-B498-43B3-948B-1728B52AA6E4}">
                 <adec:decorative xmlns:adec="http://schemas.microsoft.com/office/drawing/2017/decorative" val="1"/>
@@ -4229,20 +4394,13 @@
             <a:schemeClr val="lt1"/>
           </a:fontRef>
         </p:style>
-        <p:txBody>
-          <a:bodyPr/>
-          <a:lstStyle/>
-          <a:p>
-            <a:endParaRPr lang="en-US"/>
-          </a:p>
-        </p:txBody>
       </p:sp>
       <p:pic>
         <p:nvPicPr>
-          <p:cNvPr id="65" name="Picture 43">
+          <p:cNvPr id="155" name="Picture 154">
             <a:extLst>
               <a:ext uri="{FF2B5EF4-FFF2-40B4-BE49-F238E27FC236}">
-                <a16:creationId xmlns:a16="http://schemas.microsoft.com/office/drawing/2014/main" id="{0F47C422-E141-4484-A58E-A1A3B656C567}"/>
+                <a16:creationId xmlns:a16="http://schemas.microsoft.com/office/drawing/2014/main" id="{B083AD55-8296-44BD-8E14-DD2DDBC351B0}"/>
               </a:ext>
               <a:ext uri="{C183D7F6-B498-43B3-948B-1728B52AA6E4}">
                 <adec:decorative xmlns:adec="http://schemas.microsoft.com/office/drawing/2017/decorative" val="1"/>
@@ -4283,10 +4441,10 @@
       </p:pic>
       <p:cxnSp>
         <p:nvCxnSpPr>
-          <p:cNvPr id="69" name="Straight Connector 45">
+          <p:cNvPr id="157" name="Straight Connector 156">
             <a:extLst>
               <a:ext uri="{FF2B5EF4-FFF2-40B4-BE49-F238E27FC236}">
-                <a16:creationId xmlns:a16="http://schemas.microsoft.com/office/drawing/2014/main" id="{36A0C8A2-5797-403D-A628-7C98BC65B0C9}"/>
+                <a16:creationId xmlns:a16="http://schemas.microsoft.com/office/drawing/2014/main" id="{2BF46B26-15FC-4C5A-94FA-AE9ED64B5C20}"/>
               </a:ext>
               <a:ext uri="{C183D7F6-B498-43B3-948B-1728B52AA6E4}">
                 <adec:decorative xmlns:adec="http://schemas.microsoft.com/office/drawing/2017/decorative" val="1"/>
@@ -4337,10 +4495,10 @@
       </p:cxnSp>
       <p:cxnSp>
         <p:nvCxnSpPr>
-          <p:cNvPr id="71" name="Straight Connector 47">
+          <p:cNvPr id="159" name="Straight Connector 158">
             <a:extLst>
               <a:ext uri="{FF2B5EF4-FFF2-40B4-BE49-F238E27FC236}">
-                <a16:creationId xmlns:a16="http://schemas.microsoft.com/office/drawing/2014/main" id="{88AB1130-8367-405F-A4A7-3CBD2F2E1D61}"/>
+                <a16:creationId xmlns:a16="http://schemas.microsoft.com/office/drawing/2014/main" id="{912F6065-5345-44BD-B66E-5487CCD7A9B9}"/>
               </a:ext>
               <a:ext uri="{C183D7F6-B498-43B3-948B-1728B52AA6E4}">
                 <adec:decorative xmlns:adec="http://schemas.microsoft.com/office/drawing/2017/decorative" val="1"/>
@@ -4385,10 +4543,10 @@
       </p:cxnSp>
       <p:sp useBgFill="1">
         <p:nvSpPr>
-          <p:cNvPr id="73" name="Rectangle 49">
+          <p:cNvPr id="161" name="Rectangle 160">
             <a:extLst>
               <a:ext uri="{FF2B5EF4-FFF2-40B4-BE49-F238E27FC236}">
-                <a16:creationId xmlns:a16="http://schemas.microsoft.com/office/drawing/2014/main" id="{5DC2A66D-04C5-4863-B178-BC5DE400388D}"/>
+                <a16:creationId xmlns:a16="http://schemas.microsoft.com/office/drawing/2014/main" id="{279E1FA4-890B-4B99-B1AD-AA4B78666B54}"/>
               </a:ext>
               <a:ext uri="{C183D7F6-B498-43B3-948B-1728B52AA6E4}">
                 <adec:decorative xmlns:adec="http://schemas.microsoft.com/office/drawing/2017/decorative" val="1"/>
@@ -4445,10 +4603,10 @@
       </p:sp>
       <p:sp>
         <p:nvSpPr>
-          <p:cNvPr id="74" name="Rectangle 51">
+          <p:cNvPr id="163" name="Rectangle 162">
             <a:extLst>
               <a:ext uri="{FF2B5EF4-FFF2-40B4-BE49-F238E27FC236}">
-                <a16:creationId xmlns:a16="http://schemas.microsoft.com/office/drawing/2014/main" id="{B946B4A0-29D4-4880-9889-89F5BBD80A3C}"/>
+                <a16:creationId xmlns:a16="http://schemas.microsoft.com/office/drawing/2014/main" id="{BBEE58B7-C53C-4E7B-A78E-2C44E3E05C59}"/>
               </a:ext>
               <a:ext uri="{C183D7F6-B498-43B3-948B-1728B52AA6E4}">
                 <adec:decorative xmlns:adec="http://schemas.microsoft.com/office/drawing/2017/decorative" val="1"/>
@@ -4535,8 +4693,8 @@
         </p:nvSpPr>
         <p:spPr>
           <a:xfrm>
-            <a:off x="8673476" y="1468464"/>
-            <a:ext cx="2858835" cy="1873219"/>
+            <a:off x="1776424" y="4460798"/>
+            <a:ext cx="8637073" cy="558063"/>
           </a:xfrm>
         </p:spPr>
         <p:txBody>
@@ -4554,10 +4712,10 @@
       </p:sp>
       <p:grpSp>
         <p:nvGrpSpPr>
-          <p:cNvPr id="75" name="Group 53">
+          <p:cNvPr id="165" name="Group 164">
             <a:extLst>
               <a:ext uri="{FF2B5EF4-FFF2-40B4-BE49-F238E27FC236}">
-                <a16:creationId xmlns:a16="http://schemas.microsoft.com/office/drawing/2014/main" id="{4585E792-CEBC-4373-81F2-039BFFF70E7F}"/>
+                <a16:creationId xmlns:a16="http://schemas.microsoft.com/office/drawing/2014/main" id="{B4BA1F0E-270C-4AB7-809E-DBD5AB89665E}"/>
               </a:ext>
               <a:ext uri="{C183D7F6-B498-43B3-948B-1728B52AA6E4}">
                 <adec:decorative xmlns:adec="http://schemas.microsoft.com/office/drawing/2017/decorative" val="1"/>
@@ -4577,18 +4735,18 @@
         </p:nvGrpSpPr>
         <p:grpSpPr>
           <a:xfrm>
-            <a:off x="649418" y="477854"/>
-            <a:ext cx="3690924" cy="1899398"/>
-            <a:chOff x="7807230" y="2012810"/>
-            <a:chExt cx="3251252" cy="3459865"/>
+            <a:off x="1764906" y="323838"/>
+            <a:ext cx="8661501" cy="3652791"/>
+            <a:chOff x="7773058" y="600024"/>
+            <a:chExt cx="3630912" cy="5222486"/>
           </a:xfrm>
         </p:grpSpPr>
         <p:sp>
           <p:nvSpPr>
-            <p:cNvPr id="55" name="Rectangle 54">
+            <p:cNvPr id="166" name="Rectangle 165">
               <a:extLst>
                 <a:ext uri="{FF2B5EF4-FFF2-40B4-BE49-F238E27FC236}">
-                  <a16:creationId xmlns:a16="http://schemas.microsoft.com/office/drawing/2014/main" id="{9DB1B3CE-CEF6-4850-8897-9181A18CE5E6}"/>
+                  <a16:creationId xmlns:a16="http://schemas.microsoft.com/office/drawing/2014/main" id="{F753DA19-3231-4BF9-80B9-6200D23676FE}"/>
                 </a:ext>
                 <a:ext uri="{C183D7F6-B498-43B3-948B-1728B52AA6E4}">
                   <adec:decorative xmlns:adec="http://schemas.microsoft.com/office/drawing/2017/decorative" val="1"/>
@@ -4606,8 +4764,8 @@
           </p:nvSpPr>
           <p:spPr>
             <a:xfrm>
-              <a:off x="7807230" y="2012810"/>
-              <a:ext cx="3251252" cy="3459865"/>
+              <a:off x="7773058" y="600024"/>
+              <a:ext cx="3630912" cy="5222486"/>
             </a:xfrm>
             <a:prstGeom prst="rect">
               <a:avLst/>
@@ -4627,7 +4785,7 @@
               <a:miter lim="800000"/>
             </a:ln>
             <a:effectLst>
-              <a:outerShdw blurRad="127000" dist="190500" dir="4740000" sx="98000" sy="98000" algn="tl" rotWithShape="0">
+              <a:outerShdw blurRad="127000" dist="228600" dir="4740000" sx="98000" sy="98000" algn="tl" rotWithShape="0">
                 <a:srgbClr val="000000">
                   <a:alpha val="34000"/>
                 </a:srgbClr>
@@ -4666,10 +4824,10 @@
         </p:sp>
         <p:sp>
           <p:nvSpPr>
-            <p:cNvPr id="76" name="Rectangle 55">
+            <p:cNvPr id="167" name="Rectangle 166">
               <a:extLst>
                 <a:ext uri="{FF2B5EF4-FFF2-40B4-BE49-F238E27FC236}">
-                  <a16:creationId xmlns:a16="http://schemas.microsoft.com/office/drawing/2014/main" id="{B76C4F26-A102-41C2-B9F3-232D5D1D18FA}"/>
+                  <a16:creationId xmlns:a16="http://schemas.microsoft.com/office/drawing/2014/main" id="{241F8506-51A0-4CD0-889F-826E9E678210}"/>
                 </a:ext>
                 <a:ext uri="{C183D7F6-B498-43B3-948B-1728B52AA6E4}">
                   <adec:decorative xmlns:adec="http://schemas.microsoft.com/office/drawing/2017/decorative" val="1"/>
@@ -4687,8 +4845,8 @@
           </p:nvSpPr>
           <p:spPr>
             <a:xfrm>
-              <a:off x="7807231" y="2026142"/>
-              <a:ext cx="3251250" cy="3440203"/>
+              <a:off x="7904482" y="1062693"/>
+              <a:ext cx="3367301" cy="4292341"/>
             </a:xfrm>
             <a:prstGeom prst="rect">
               <a:avLst/>
@@ -4704,7 +4862,7 @@
               </a:gsLst>
               <a:lin ang="16200000" scaled="0"/>
             </a:gradFill>
-            <a:ln w="76200" cmpd="sng">
+            <a:ln w="50800" cmpd="sng">
               <a:solidFill>
                 <a:srgbClr val="191919"/>
               </a:solidFill>
@@ -4722,7 +4880,7 @@
               <a:lightRig rig="threePt" dir="t"/>
             </a:scene3d>
             <a:sp3d>
-              <a:bevelT w="38100" h="38100" prst="relaxedInset"/>
+              <a:bevelT prst="relaxedInset"/>
             </a:sp3d>
           </p:spPr>
           <p:style>
@@ -4749,6 +4907,100 @@
           </p:txBody>
         </p:sp>
       </p:grpSp>
+      <p:sp>
+        <p:nvSpPr>
+          <p:cNvPr id="169" name="Rectangle 168">
+            <a:extLst>
+              <a:ext uri="{FF2B5EF4-FFF2-40B4-BE49-F238E27FC236}">
+                <a16:creationId xmlns:a16="http://schemas.microsoft.com/office/drawing/2014/main" id="{29BCA0E2-0826-4688-8066-477F24371DDD}"/>
+              </a:ext>
+              <a:ext uri="{C183D7F6-B498-43B3-948B-1728B52AA6E4}">
+                <adec:decorative xmlns:adec="http://schemas.microsoft.com/office/drawing/2017/decorative" val="1"/>
+              </a:ext>
+            </a:extLst>
+          </p:cNvPr>
+          <p:cNvSpPr>
+            <a:spLocks noGrp="1" noRot="1" noChangeAspect="1" noMove="1" noResize="1" noEditPoints="1" noAdjustHandles="1" noChangeArrowheads="1" noChangeShapeType="1" noTextEdit="1"/>
+          </p:cNvSpPr>
+          <p:nvPr>
+            <p:extLst>
+              <p:ext uri="{386F3935-93C4-4BCD-93E2-E3B085C9AB24}">
+                <p16:designElem xmlns:p16="http://schemas.microsoft.com/office/powerpoint/2015/main" val="1"/>
+              </p:ext>
+            </p:extLst>
+          </p:nvPr>
+        </p:nvSpPr>
+        <p:spPr>
+          <a:xfrm>
+            <a:off x="2244322" y="822145"/>
+            <a:ext cx="7702878" cy="2662923"/>
+          </a:xfrm>
+          <a:prstGeom prst="rect">
+            <a:avLst/>
+          </a:prstGeom>
+          <a:solidFill>
+            <a:schemeClr val="bg1"/>
+          </a:solidFill>
+          <a:ln w="6350">
+            <a:solidFill>
+              <a:schemeClr val="bg2"/>
+            </a:solidFill>
+          </a:ln>
+        </p:spPr>
+        <p:style>
+          <a:lnRef idx="2">
+            <a:schemeClr val="accent1">
+              <a:shade val="50000"/>
+            </a:schemeClr>
+          </a:lnRef>
+          <a:fillRef idx="1">
+            <a:schemeClr val="accent1"/>
+          </a:fillRef>
+          <a:effectRef idx="0">
+            <a:schemeClr val="accent1"/>
+          </a:effectRef>
+          <a:fontRef idx="minor">
+            <a:schemeClr val="lt1"/>
+          </a:fontRef>
+        </p:style>
+        <p:txBody>
+          <a:bodyPr rtlCol="0" anchor="ctr"/>
+          <a:lstStyle/>
+          <a:p>
+            <a:pPr algn="ctr"/>
+            <a:endParaRPr lang="en-US"/>
+          </a:p>
+        </p:txBody>
+      </p:sp>
+      <p:pic>
+        <p:nvPicPr>
+          <p:cNvPr id="5" name="Picture 4" descr="A graph of different colored bars&#10;&#10;Description automatically generated">
+            <a:extLst>
+              <a:ext uri="{FF2B5EF4-FFF2-40B4-BE49-F238E27FC236}">
+                <a16:creationId xmlns:a16="http://schemas.microsoft.com/office/drawing/2014/main" id="{77940EE3-DC75-82EA-EBA2-07199CCFC186}"/>
+              </a:ext>
+            </a:extLst>
+          </p:cNvPr>
+          <p:cNvPicPr>
+            <a:picLocks noChangeAspect="1"/>
+          </p:cNvPicPr>
+          <p:nvPr/>
+        </p:nvPicPr>
+        <p:blipFill rotWithShape="1">
+          <a:blip r:embed="rId3"/>
+          <a:srcRect l="15622" r="15625" b="3"/>
+          <a:stretch/>
+        </p:blipFill>
+        <p:spPr>
+          <a:xfrm>
+            <a:off x="2408470" y="963739"/>
+            <a:ext cx="3599926" cy="2369223"/>
+          </a:xfrm>
+          <a:prstGeom prst="rect">
+            <a:avLst/>
+          </a:prstGeom>
+        </p:spPr>
+      </p:pic>
       <p:pic>
         <p:nvPicPr>
           <p:cNvPr id="8" name="Picture 7" descr="A graph with blue and orange lines&#10;&#10;Description automatically generated">
@@ -4764,14 +5016,14 @@
           <p:nvPr/>
         </p:nvPicPr>
         <p:blipFill rotWithShape="1">
-          <a:blip r:embed="rId3"/>
-          <a:srcRect l="2144" r="5251" b="4"/>
+          <a:blip r:embed="rId4"/>
+          <a:srcRect l="15400" r="18502" b="-2"/>
           <a:stretch/>
         </p:blipFill>
         <p:spPr>
           <a:xfrm>
-            <a:off x="808859" y="637525"/>
-            <a:ext cx="3360091" cy="1578294"/>
+            <a:off x="6172121" y="963739"/>
+            <a:ext cx="3599926" cy="2369223"/>
           </a:xfrm>
           <a:prstGeom prst="rect">
             <a:avLst/>
@@ -4780,10 +5032,10 @@
       </p:pic>
       <p:cxnSp>
         <p:nvCxnSpPr>
-          <p:cNvPr id="77" name="Straight Connector 57">
+          <p:cNvPr id="171" name="Straight Connector 170">
             <a:extLst>
               <a:ext uri="{FF2B5EF4-FFF2-40B4-BE49-F238E27FC236}">
-                <a16:creationId xmlns:a16="http://schemas.microsoft.com/office/drawing/2014/main" id="{EDE6ABFB-93B7-4958-8605-49894A649C7D}"/>
+                <a16:creationId xmlns:a16="http://schemas.microsoft.com/office/drawing/2014/main" id="{4C3F4B1E-3EAB-415B-825A-464AAF1D7510}"/>
               </a:ext>
               <a:ext uri="{C183D7F6-B498-43B3-948B-1728B52AA6E4}">
                 <adec:decorative xmlns:adec="http://schemas.microsoft.com/office/drawing/2017/decorative" val="1"/>
@@ -4803,8 +5055,8 @@
         </p:nvCxnSpPr>
         <p:spPr>
           <a:xfrm>
-            <a:off x="8680960" y="3526496"/>
-            <a:ext cx="2844424" cy="0"/>
+            <a:off x="1776728" y="5027185"/>
+            <a:ext cx="8643010" cy="0"/>
           </a:xfrm>
           <a:prstGeom prst="line">
             <a:avLst/>
@@ -4826,526 +5078,12 @@
           </a:fontRef>
         </p:style>
       </p:cxnSp>
-      <p:sp>
-        <p:nvSpPr>
-          <p:cNvPr id="60" name="Rectangle 59">
+      <p:pic>
+        <p:nvPicPr>
+          <p:cNvPr id="173" name="Picture 172">
             <a:extLst>
               <a:ext uri="{FF2B5EF4-FFF2-40B4-BE49-F238E27FC236}">
-                <a16:creationId xmlns:a16="http://schemas.microsoft.com/office/drawing/2014/main" id="{A7C6096F-937B-4449-A0D5-E090BA83AD9F}"/>
-              </a:ext>
-              <a:ext uri="{C183D7F6-B498-43B3-948B-1728B52AA6E4}">
-                <adec:decorative xmlns:adec="http://schemas.microsoft.com/office/drawing/2017/decorative" val="1"/>
-              </a:ext>
-            </a:extLst>
-          </p:cNvPr>
-          <p:cNvSpPr>
-            <a:spLocks noGrp="1" noRot="1" noChangeAspect="1" noMove="1" noResize="1" noEditPoints="1" noAdjustHandles="1" noChangeArrowheads="1" noChangeShapeType="1" noTextEdit="1"/>
-          </p:cNvSpPr>
-          <p:nvPr>
-            <p:extLst>
-              <p:ext uri="{386F3935-93C4-4BCD-93E2-E3B085C9AB24}">
-                <p16:designElem xmlns:p16="http://schemas.microsoft.com/office/powerpoint/2015/main" val="1"/>
-              </p:ext>
-            </p:extLst>
-          </p:nvPr>
-        </p:nvSpPr>
-        <p:spPr>
-          <a:xfrm>
-            <a:off x="645132" y="5447610"/>
-            <a:ext cx="163726" cy="164592"/>
-          </a:xfrm>
-          <a:prstGeom prst="rect">
-            <a:avLst/>
-          </a:prstGeom>
-          <a:solidFill>
-            <a:srgbClr val="FF265A"/>
-          </a:solidFill>
-          <a:ln>
-            <a:noFill/>
-          </a:ln>
-          <a:effectLst/>
-        </p:spPr>
-        <p:style>
-          <a:lnRef idx="1">
-            <a:schemeClr val="accent1"/>
-          </a:lnRef>
-          <a:fillRef idx="3">
-            <a:schemeClr val="accent1"/>
-          </a:fillRef>
-          <a:effectRef idx="2">
-            <a:schemeClr val="accent1"/>
-          </a:effectRef>
-          <a:fontRef idx="minor">
-            <a:schemeClr val="lt1"/>
-          </a:fontRef>
-        </p:style>
-        <p:txBody>
-          <a:bodyPr rtlCol="0" anchor="ctr"/>
-          <a:lstStyle/>
-          <a:p>
-            <a:pPr algn="ctr"/>
-            <a:endParaRPr lang="en-US"/>
-          </a:p>
-        </p:txBody>
-      </p:sp>
-      <p:grpSp>
-        <p:nvGrpSpPr>
-          <p:cNvPr id="62" name="Group 61">
-            <a:extLst>
-              <a:ext uri="{FF2B5EF4-FFF2-40B4-BE49-F238E27FC236}">
-                <a16:creationId xmlns:a16="http://schemas.microsoft.com/office/drawing/2014/main" id="{9B3D3549-2708-43E0-AFB7-2BC55A61D7EC}"/>
-              </a:ext>
-              <a:ext uri="{C183D7F6-B498-43B3-948B-1728B52AA6E4}">
-                <adec:decorative xmlns:adec="http://schemas.microsoft.com/office/drawing/2017/decorative" val="1"/>
-              </a:ext>
-            </a:extLst>
-          </p:cNvPr>
-          <p:cNvGrpSpPr>
-            <a:grpSpLocks noGrp="1" noUngrp="1" noRot="1" noChangeAspect="1" noMove="1" noResize="1"/>
-          </p:cNvGrpSpPr>
-          <p:nvPr>
-            <p:extLst>
-              <p:ext uri="{386F3935-93C4-4BCD-93E2-E3B085C9AB24}">
-                <p16:designElem xmlns:p16="http://schemas.microsoft.com/office/powerpoint/2015/main" val="1"/>
-              </p:ext>
-            </p:extLst>
-          </p:nvPr>
-        </p:nvGrpSpPr>
-        <p:grpSpPr>
-          <a:xfrm>
-            <a:off x="639509" y="2542318"/>
-            <a:ext cx="3690924" cy="3074978"/>
-            <a:chOff x="7807230" y="2012810"/>
-            <a:chExt cx="3251252" cy="3459865"/>
-          </a:xfrm>
-        </p:grpSpPr>
-        <p:sp>
-          <p:nvSpPr>
-            <p:cNvPr id="63" name="Rectangle 62">
-              <a:extLst>
-                <a:ext uri="{FF2B5EF4-FFF2-40B4-BE49-F238E27FC236}">
-                  <a16:creationId xmlns:a16="http://schemas.microsoft.com/office/drawing/2014/main" id="{943D0E13-CC55-4F7E-9992-0FA9D43F1A3B}"/>
-                </a:ext>
-                <a:ext uri="{C183D7F6-B498-43B3-948B-1728B52AA6E4}">
-                  <adec:decorative xmlns:adec="http://schemas.microsoft.com/office/drawing/2017/decorative" val="1"/>
-                </a:ext>
-              </a:extLst>
-            </p:cNvPr>
-            <p:cNvSpPr/>
-            <p:nvPr>
-              <p:extLst>
-                <p:ext uri="{386F3935-93C4-4BCD-93E2-E3B085C9AB24}">
-                  <p16:designElem xmlns:p16="http://schemas.microsoft.com/office/powerpoint/2015/main" val="1"/>
-                </p:ext>
-              </p:extLst>
-            </p:nvPr>
-          </p:nvSpPr>
-          <p:spPr>
-            <a:xfrm>
-              <a:off x="7807230" y="2012810"/>
-              <a:ext cx="3251252" cy="3459865"/>
-            </a:xfrm>
-            <a:prstGeom prst="rect">
-              <a:avLst/>
-            </a:prstGeom>
-            <a:gradFill>
-              <a:gsLst>
-                <a:gs pos="0">
-                  <a:srgbClr val="000001"/>
-                </a:gs>
-                <a:gs pos="100000">
-                  <a:srgbClr val="191919"/>
-                </a:gs>
-              </a:gsLst>
-            </a:gradFill>
-            <a:ln w="76200" cmpd="sng">
-              <a:noFill/>
-              <a:miter lim="800000"/>
-            </a:ln>
-            <a:effectLst>
-              <a:outerShdw blurRad="127000" dist="190500" dir="4740000" sx="98000" sy="98000" algn="tl" rotWithShape="0">
-                <a:srgbClr val="000000">
-                  <a:alpha val="34000"/>
-                </a:srgbClr>
-              </a:outerShdw>
-            </a:effectLst>
-            <a:scene3d>
-              <a:camera prst="orthographicFront"/>
-              <a:lightRig rig="threePt" dir="t"/>
-            </a:scene3d>
-            <a:sp3d>
-              <a:bevelT w="152400" h="50800" prst="softRound"/>
-            </a:sp3d>
-          </p:spPr>
-          <p:style>
-            <a:lnRef idx="1">
-              <a:schemeClr val="accent1"/>
-            </a:lnRef>
-            <a:fillRef idx="3">
-              <a:schemeClr val="accent1"/>
-            </a:fillRef>
-            <a:effectRef idx="2">
-              <a:schemeClr val="accent1"/>
-            </a:effectRef>
-            <a:fontRef idx="minor">
-              <a:schemeClr val="lt1"/>
-            </a:fontRef>
-          </p:style>
-          <p:txBody>
-            <a:bodyPr rtlCol="0" anchor="ctr"/>
-            <a:lstStyle/>
-            <a:p>
-              <a:pPr algn="ctr"/>
-              <a:endParaRPr lang="en-US"/>
-            </a:p>
-          </p:txBody>
-        </p:sp>
-        <p:sp>
-          <p:nvSpPr>
-            <p:cNvPr id="64" name="Rectangle 63">
-              <a:extLst>
-                <a:ext uri="{FF2B5EF4-FFF2-40B4-BE49-F238E27FC236}">
-                  <a16:creationId xmlns:a16="http://schemas.microsoft.com/office/drawing/2014/main" id="{C412843C-67D1-4623-A285-21A9C7F1CEE8}"/>
-                </a:ext>
-                <a:ext uri="{C183D7F6-B498-43B3-948B-1728B52AA6E4}">
-                  <adec:decorative xmlns:adec="http://schemas.microsoft.com/office/drawing/2017/decorative" val="1"/>
-                </a:ext>
-              </a:extLst>
-            </p:cNvPr>
-            <p:cNvSpPr/>
-            <p:nvPr>
-              <p:extLst>
-                <p:ext uri="{386F3935-93C4-4BCD-93E2-E3B085C9AB24}">
-                  <p16:designElem xmlns:p16="http://schemas.microsoft.com/office/powerpoint/2015/main" val="1"/>
-                </p:ext>
-              </p:extLst>
-            </p:nvPr>
-          </p:nvSpPr>
-          <p:spPr>
-            <a:xfrm>
-              <a:off x="7807231" y="2026142"/>
-              <a:ext cx="3251250" cy="3440203"/>
-            </a:xfrm>
-            <a:prstGeom prst="rect">
-              <a:avLst/>
-            </a:prstGeom>
-            <a:gradFill>
-              <a:gsLst>
-                <a:gs pos="0">
-                  <a:srgbClr val="DADADA"/>
-                </a:gs>
-                <a:gs pos="100000">
-                  <a:srgbClr val="FFFFFE"/>
-                </a:gs>
-              </a:gsLst>
-              <a:lin ang="16200000" scaled="0"/>
-            </a:gradFill>
-            <a:ln w="76200" cmpd="sng">
-              <a:solidFill>
-                <a:srgbClr val="191919"/>
-              </a:solidFill>
-              <a:miter lim="800000"/>
-            </a:ln>
-            <a:effectLst>
-              <a:innerShdw blurRad="63500" dist="88900" dir="14100000">
-                <a:srgbClr val="000000">
-                  <a:alpha val="30000"/>
-                </a:srgbClr>
-              </a:innerShdw>
-            </a:effectLst>
-            <a:scene3d>
-              <a:camera prst="orthographicFront"/>
-              <a:lightRig rig="threePt" dir="t"/>
-            </a:scene3d>
-            <a:sp3d>
-              <a:bevelT w="38100" h="38100" prst="relaxedInset"/>
-            </a:sp3d>
-          </p:spPr>
-          <p:style>
-            <a:lnRef idx="1">
-              <a:schemeClr val="accent1"/>
-            </a:lnRef>
-            <a:fillRef idx="3">
-              <a:schemeClr val="accent1"/>
-            </a:fillRef>
-            <a:effectRef idx="2">
-              <a:schemeClr val="accent1"/>
-            </a:effectRef>
-            <a:fontRef idx="minor">
-              <a:schemeClr val="lt1"/>
-            </a:fontRef>
-          </p:style>
-          <p:txBody>
-            <a:bodyPr rtlCol="0" anchor="ctr"/>
-            <a:lstStyle/>
-            <a:p>
-              <a:pPr algn="ctr"/>
-              <a:endParaRPr lang="en-US"/>
-            </a:p>
-          </p:txBody>
-        </p:sp>
-      </p:grpSp>
-      <p:pic>
-        <p:nvPicPr>
-          <p:cNvPr id="9" name="Picture 8" descr="A graph with text on it&#10;&#10;Description automatically generated with medium confidence">
-            <a:extLst>
-              <a:ext uri="{FF2B5EF4-FFF2-40B4-BE49-F238E27FC236}">
-                <a16:creationId xmlns:a16="http://schemas.microsoft.com/office/drawing/2014/main" id="{42EE3B12-8AEE-9FEE-F7FC-B98332CD9F05}"/>
-              </a:ext>
-            </a:extLst>
-          </p:cNvPr>
-          <p:cNvPicPr>
-            <a:picLocks noChangeAspect="1"/>
-          </p:cNvPicPr>
-          <p:nvPr/>
-        </p:nvPicPr>
-        <p:blipFill rotWithShape="1">
-          <a:blip r:embed="rId4"/>
-          <a:srcRect l="23982" r="21803" b="-1"/>
-          <a:stretch/>
-        </p:blipFill>
-        <p:spPr>
-          <a:xfrm>
-            <a:off x="808859" y="2706910"/>
-            <a:ext cx="3357848" cy="2740699"/>
-          </a:xfrm>
-          <a:prstGeom prst="rect">
-            <a:avLst/>
-          </a:prstGeom>
-        </p:spPr>
-      </p:pic>
-      <p:grpSp>
-        <p:nvGrpSpPr>
-          <p:cNvPr id="66" name="Group 65">
-            <a:extLst>
-              <a:ext uri="{FF2B5EF4-FFF2-40B4-BE49-F238E27FC236}">
-                <a16:creationId xmlns:a16="http://schemas.microsoft.com/office/drawing/2014/main" id="{D71ACE82-9EC4-4063-B534-2547CFA0277F}"/>
-              </a:ext>
-              <a:ext uri="{C183D7F6-B498-43B3-948B-1728B52AA6E4}">
-                <adec:decorative xmlns:adec="http://schemas.microsoft.com/office/drawing/2017/decorative" val="1"/>
-              </a:ext>
-            </a:extLst>
-          </p:cNvPr>
-          <p:cNvGrpSpPr>
-            <a:grpSpLocks noGrp="1" noUngrp="1" noRot="1" noChangeAspect="1" noMove="1" noResize="1"/>
-          </p:cNvGrpSpPr>
-          <p:nvPr>
-            <p:extLst>
-              <p:ext uri="{386F3935-93C4-4BCD-93E2-E3B085C9AB24}">
-                <p16:designElem xmlns:p16="http://schemas.microsoft.com/office/powerpoint/2015/main" val="1"/>
-              </p:ext>
-            </p:extLst>
-          </p:nvPr>
-        </p:nvGrpSpPr>
-        <p:grpSpPr>
-          <a:xfrm>
-            <a:off x="4494158" y="465668"/>
-            <a:ext cx="3695099" cy="5156200"/>
-            <a:chOff x="7807230" y="2012810"/>
-            <a:chExt cx="3251252" cy="3459865"/>
-          </a:xfrm>
-        </p:grpSpPr>
-        <p:sp>
-          <p:nvSpPr>
-            <p:cNvPr id="67" name="Rectangle 66">
-              <a:extLst>
-                <a:ext uri="{FF2B5EF4-FFF2-40B4-BE49-F238E27FC236}">
-                  <a16:creationId xmlns:a16="http://schemas.microsoft.com/office/drawing/2014/main" id="{1B2CA19F-0B4B-4FA6-985A-F983AA693E70}"/>
-                </a:ext>
-                <a:ext uri="{C183D7F6-B498-43B3-948B-1728B52AA6E4}">
-                  <adec:decorative xmlns:adec="http://schemas.microsoft.com/office/drawing/2017/decorative" val="1"/>
-                </a:ext>
-              </a:extLst>
-            </p:cNvPr>
-            <p:cNvSpPr/>
-            <p:nvPr>
-              <p:extLst>
-                <p:ext uri="{386F3935-93C4-4BCD-93E2-E3B085C9AB24}">
-                  <p16:designElem xmlns:p16="http://schemas.microsoft.com/office/powerpoint/2015/main" val="1"/>
-                </p:ext>
-              </p:extLst>
-            </p:nvPr>
-          </p:nvSpPr>
-          <p:spPr>
-            <a:xfrm>
-              <a:off x="7807230" y="2012810"/>
-              <a:ext cx="3251252" cy="3459865"/>
-            </a:xfrm>
-            <a:prstGeom prst="rect">
-              <a:avLst/>
-            </a:prstGeom>
-            <a:gradFill>
-              <a:gsLst>
-                <a:gs pos="0">
-                  <a:srgbClr val="000001"/>
-                </a:gs>
-                <a:gs pos="100000">
-                  <a:srgbClr val="191919"/>
-                </a:gs>
-              </a:gsLst>
-            </a:gradFill>
-            <a:ln w="76200" cmpd="sng">
-              <a:noFill/>
-              <a:miter lim="800000"/>
-            </a:ln>
-            <a:effectLst>
-              <a:outerShdw blurRad="127000" dist="190500" dir="4740000" sx="98000" sy="98000" algn="tl" rotWithShape="0">
-                <a:srgbClr val="000000">
-                  <a:alpha val="34000"/>
-                </a:srgbClr>
-              </a:outerShdw>
-            </a:effectLst>
-            <a:scene3d>
-              <a:camera prst="orthographicFront"/>
-              <a:lightRig rig="threePt" dir="t"/>
-            </a:scene3d>
-            <a:sp3d>
-              <a:bevelT w="152400" h="50800" prst="softRound"/>
-            </a:sp3d>
-          </p:spPr>
-          <p:style>
-            <a:lnRef idx="1">
-              <a:schemeClr val="accent1"/>
-            </a:lnRef>
-            <a:fillRef idx="3">
-              <a:schemeClr val="accent1"/>
-            </a:fillRef>
-            <a:effectRef idx="2">
-              <a:schemeClr val="accent1"/>
-            </a:effectRef>
-            <a:fontRef idx="minor">
-              <a:schemeClr val="lt1"/>
-            </a:fontRef>
-          </p:style>
-          <p:txBody>
-            <a:bodyPr rtlCol="0" anchor="ctr"/>
-            <a:lstStyle/>
-            <a:p>
-              <a:pPr algn="ctr"/>
-              <a:endParaRPr lang="en-US"/>
-            </a:p>
-          </p:txBody>
-        </p:sp>
-        <p:sp>
-          <p:nvSpPr>
-            <p:cNvPr id="68" name="Rectangle 67">
-              <a:extLst>
-                <a:ext uri="{FF2B5EF4-FFF2-40B4-BE49-F238E27FC236}">
-                  <a16:creationId xmlns:a16="http://schemas.microsoft.com/office/drawing/2014/main" id="{9A049034-755E-424A-A61B-6E70DE1C1B80}"/>
-                </a:ext>
-                <a:ext uri="{C183D7F6-B498-43B3-948B-1728B52AA6E4}">
-                  <adec:decorative xmlns:adec="http://schemas.microsoft.com/office/drawing/2017/decorative" val="1"/>
-                </a:ext>
-              </a:extLst>
-            </p:cNvPr>
-            <p:cNvSpPr/>
-            <p:nvPr>
-              <p:extLst>
-                <p:ext uri="{386F3935-93C4-4BCD-93E2-E3B085C9AB24}">
-                  <p16:designElem xmlns:p16="http://schemas.microsoft.com/office/powerpoint/2015/main" val="1"/>
-                </p:ext>
-              </p:extLst>
-            </p:nvPr>
-          </p:nvSpPr>
-          <p:spPr>
-            <a:xfrm>
-              <a:off x="7807231" y="2026142"/>
-              <a:ext cx="3251250" cy="3440203"/>
-            </a:xfrm>
-            <a:prstGeom prst="rect">
-              <a:avLst/>
-            </a:prstGeom>
-            <a:gradFill>
-              <a:gsLst>
-                <a:gs pos="0">
-                  <a:srgbClr val="DADADA"/>
-                </a:gs>
-                <a:gs pos="100000">
-                  <a:srgbClr val="FFFFFE"/>
-                </a:gs>
-              </a:gsLst>
-              <a:lin ang="16200000" scaled="0"/>
-            </a:gradFill>
-            <a:ln w="76200" cmpd="sng">
-              <a:solidFill>
-                <a:srgbClr val="191919"/>
-              </a:solidFill>
-              <a:miter lim="800000"/>
-            </a:ln>
-            <a:effectLst>
-              <a:innerShdw blurRad="63500" dist="88900" dir="14100000">
-                <a:srgbClr val="000000">
-                  <a:alpha val="30000"/>
-                </a:srgbClr>
-              </a:innerShdw>
-            </a:effectLst>
-            <a:scene3d>
-              <a:camera prst="orthographicFront"/>
-              <a:lightRig rig="threePt" dir="t"/>
-            </a:scene3d>
-            <a:sp3d>
-              <a:bevelT w="38100" h="38100" prst="relaxedInset"/>
-            </a:sp3d>
-          </p:spPr>
-          <p:style>
-            <a:lnRef idx="1">
-              <a:schemeClr val="accent1"/>
-            </a:lnRef>
-            <a:fillRef idx="3">
-              <a:schemeClr val="accent1"/>
-            </a:fillRef>
-            <a:effectRef idx="2">
-              <a:schemeClr val="accent1"/>
-            </a:effectRef>
-            <a:fontRef idx="minor">
-              <a:schemeClr val="lt1"/>
-            </a:fontRef>
-          </p:style>
-          <p:txBody>
-            <a:bodyPr rtlCol="0" anchor="ctr"/>
-            <a:lstStyle/>
-            <a:p>
-              <a:pPr algn="ctr"/>
-              <a:endParaRPr lang="en-US"/>
-            </a:p>
-          </p:txBody>
-        </p:sp>
-      </p:grpSp>
-      <p:pic>
-        <p:nvPicPr>
-          <p:cNvPr id="5" name="Picture 4" descr="A graph of different colored bars&#10;&#10;Description automatically generated">
-            <a:extLst>
-              <a:ext uri="{FF2B5EF4-FFF2-40B4-BE49-F238E27FC236}">
-                <a16:creationId xmlns:a16="http://schemas.microsoft.com/office/drawing/2014/main" id="{77940EE3-DC75-82EA-EBA2-07199CCFC186}"/>
-              </a:ext>
-            </a:extLst>
-          </p:cNvPr>
-          <p:cNvPicPr>
-            <a:picLocks noChangeAspect="1"/>
-          </p:cNvPicPr>
-          <p:nvPr/>
-        </p:nvPicPr>
-        <p:blipFill rotWithShape="1">
-          <a:blip r:embed="rId5"/>
-          <a:srcRect l="34217" r="34217" b="-1"/>
-          <a:stretch/>
-        </p:blipFill>
-        <p:spPr>
-          <a:xfrm>
-            <a:off x="4659364" y="637525"/>
-            <a:ext cx="3354726" cy="4809022"/>
-          </a:xfrm>
-          <a:prstGeom prst="rect">
-            <a:avLst/>
-          </a:prstGeom>
-        </p:spPr>
-      </p:pic>
-      <p:pic>
-        <p:nvPicPr>
-          <p:cNvPr id="70" name="Picture 69">
-            <a:extLst>
-              <a:ext uri="{FF2B5EF4-FFF2-40B4-BE49-F238E27FC236}">
-                <a16:creationId xmlns:a16="http://schemas.microsoft.com/office/drawing/2014/main" id="{0B70FCFC-4BB1-43BA-8DDF-BE303581A208}"/>
+                <a16:creationId xmlns:a16="http://schemas.microsoft.com/office/drawing/2014/main" id="{6B708961-E777-4956-A983-78A4F532F460}"/>
               </a:ext>
               <a:ext uri="{C183D7F6-B498-43B3-948B-1728B52AA6E4}">
                 <adec:decorative xmlns:adec="http://schemas.microsoft.com/office/drawing/2017/decorative" val="1"/>
@@ -5386,10 +5124,10 @@
       </p:pic>
       <p:cxnSp>
         <p:nvCxnSpPr>
-          <p:cNvPr id="72" name="Straight Connector 71">
+          <p:cNvPr id="175" name="Straight Connector 174">
             <a:extLst>
               <a:ext uri="{FF2B5EF4-FFF2-40B4-BE49-F238E27FC236}">
-                <a16:creationId xmlns:a16="http://schemas.microsoft.com/office/drawing/2014/main" id="{344EFF15-ABBD-4B8B-AE77-EEF1FBEE595F}"/>
+                <a16:creationId xmlns:a16="http://schemas.microsoft.com/office/drawing/2014/main" id="{59D3B50E-372C-47D8-BC90-104318AD8B8F}"/>
               </a:ext>
               <a:ext uri="{C183D7F6-B498-43B3-948B-1728B52AA6E4}">
                 <adec:decorative xmlns:adec="http://schemas.microsoft.com/office/drawing/2017/decorative" val="1"/>
@@ -5438,6 +5176,38 @@
           </a:fontRef>
         </p:style>
       </p:cxnSp>
+      <p:sp>
+        <p:nvSpPr>
+          <p:cNvPr id="3" name="TextBox 2">
+            <a:extLst>
+              <a:ext uri="{FF2B5EF4-FFF2-40B4-BE49-F238E27FC236}">
+                <a16:creationId xmlns:a16="http://schemas.microsoft.com/office/drawing/2014/main" id="{A117F20F-8B15-AD28-F35C-238008790A35}"/>
+              </a:ext>
+            </a:extLst>
+          </p:cNvPr>
+          <p:cNvSpPr txBox="1"/>
+          <p:nvPr/>
+        </p:nvSpPr>
+        <p:spPr>
+          <a:xfrm>
+            <a:off x="4298731" y="3878317"/>
+            <a:ext cx="184731" cy="369332"/>
+          </a:xfrm>
+          <a:prstGeom prst="rect">
+            <a:avLst/>
+          </a:prstGeom>
+          <a:noFill/>
+        </p:spPr>
+        <p:txBody>
+          <a:bodyPr wrap="none" rtlCol="0">
+            <a:spAutoFit/>
+          </a:bodyPr>
+          <a:lstStyle/>
+          <a:p>
+            <a:endParaRPr lang="en-US" dirty="0"/>
+          </a:p>
+        </p:txBody>
+      </p:sp>
     </p:spTree>
     <p:extLst>
       <p:ext uri="{BB962C8B-B14F-4D97-AF65-F5344CB8AC3E}">
@@ -5773,6 +5543,114 @@
           <a:p>
             <a:r>
               <a:rPr lang="en-US" dirty="0"/>
+              <a:t>Model Development Journey</a:t>
+            </a:r>
+          </a:p>
+        </p:txBody>
+      </p:sp>
+      <p:sp>
+        <p:nvSpPr>
+          <p:cNvPr id="6" name="Content Placeholder 5">
+            <a:extLst>
+              <a:ext uri="{FF2B5EF4-FFF2-40B4-BE49-F238E27FC236}">
+                <a16:creationId xmlns:a16="http://schemas.microsoft.com/office/drawing/2014/main" id="{A2078548-991F-84F9-A3AA-F1D37DF3D964}"/>
+              </a:ext>
+            </a:extLst>
+          </p:cNvPr>
+          <p:cNvSpPr>
+            <a:spLocks noGrp="1"/>
+          </p:cNvSpPr>
+          <p:nvPr>
+            <p:ph sz="half" idx="2"/>
+          </p:nvPr>
+        </p:nvSpPr>
+        <p:spPr/>
+        <p:txBody>
+          <a:bodyPr/>
+          <a:lstStyle/>
+          <a:p>
+            <a:endParaRPr lang="en-US"/>
+          </a:p>
+        </p:txBody>
+      </p:sp>
+      <p:sp>
+        <p:nvSpPr>
+          <p:cNvPr id="8" name="Content Placeholder 7">
+            <a:extLst>
+              <a:ext uri="{FF2B5EF4-FFF2-40B4-BE49-F238E27FC236}">
+                <a16:creationId xmlns:a16="http://schemas.microsoft.com/office/drawing/2014/main" id="{D759F654-DB20-41A3-DF97-B1D18C96340E}"/>
+              </a:ext>
+            </a:extLst>
+          </p:cNvPr>
+          <p:cNvSpPr>
+            <a:spLocks noGrp="1"/>
+          </p:cNvSpPr>
+          <p:nvPr>
+            <p:ph sz="half" idx="1"/>
+          </p:nvPr>
+        </p:nvSpPr>
+        <p:spPr/>
+        <p:txBody>
+          <a:bodyPr/>
+          <a:lstStyle/>
+          <a:p>
+            <a:endParaRPr lang="en-US"/>
+          </a:p>
+        </p:txBody>
+      </p:sp>
+    </p:spTree>
+    <p:extLst>
+      <p:ext uri="{BB962C8B-B14F-4D97-AF65-F5344CB8AC3E}">
+        <p14:creationId xmlns:p14="http://schemas.microsoft.com/office/powerpoint/2010/main" val="2958221780"/>
+      </p:ext>
+    </p:extLst>
+  </p:cSld>
+  <p:clrMapOvr>
+    <a:masterClrMapping/>
+  </p:clrMapOvr>
+</p:sld>
+</file>
+
+<file path=ppt/slides/slide7.xml><?xml version="1.0" encoding="utf-8"?>
+<p:sld xmlns:a="http://schemas.openxmlformats.org/drawingml/2006/main" xmlns:r="http://schemas.openxmlformats.org/officeDocument/2006/relationships" xmlns:p="http://schemas.openxmlformats.org/presentationml/2006/main">
+  <p:cSld>
+    <p:spTree>
+      <p:nvGrpSpPr>
+        <p:cNvPr id="1" name=""/>
+        <p:cNvGrpSpPr/>
+        <p:nvPr/>
+      </p:nvGrpSpPr>
+      <p:grpSpPr>
+        <a:xfrm>
+          <a:off x="0" y="0"/>
+          <a:ext cx="0" cy="0"/>
+          <a:chOff x="0" y="0"/>
+          <a:chExt cx="0" cy="0"/>
+        </a:xfrm>
+      </p:grpSpPr>
+      <p:sp>
+        <p:nvSpPr>
+          <p:cNvPr id="2" name="Title 1">
+            <a:extLst>
+              <a:ext uri="{FF2B5EF4-FFF2-40B4-BE49-F238E27FC236}">
+                <a16:creationId xmlns:a16="http://schemas.microsoft.com/office/drawing/2014/main" id="{13B897CC-6FF3-26C8-6188-577ED773CEE1}"/>
+              </a:ext>
+            </a:extLst>
+          </p:cNvPr>
+          <p:cNvSpPr>
+            <a:spLocks noGrp="1"/>
+          </p:cNvSpPr>
+          <p:nvPr>
+            <p:ph type="title"/>
+          </p:nvPr>
+        </p:nvSpPr>
+        <p:spPr/>
+        <p:txBody>
+          <a:bodyPr/>
+          <a:lstStyle/>
+          <a:p>
+            <a:r>
+              <a:rPr lang="en-US" dirty="0"/>
               <a:t>Model Training &amp; Evaluation</a:t>
             </a:r>
           </a:p>
@@ -5796,12 +5674,14 @@
         </p:nvSpPr>
         <p:spPr>
           <a:xfrm>
-            <a:off x="397465" y="2017343"/>
-            <a:ext cx="4645152" cy="2027722"/>
+            <a:off x="263242" y="2084455"/>
+            <a:ext cx="3855752" cy="2027722"/>
           </a:xfrm>
         </p:spPr>
         <p:txBody>
-          <a:bodyPr/>
+          <a:bodyPr>
+            <a:normAutofit fontScale="92500" lnSpcReduction="20000"/>
+          </a:bodyPr>
           <a:lstStyle/>
           <a:p>
             <a:r>
@@ -5836,6 +5716,17 @@
               <a:rPr lang="en-US" dirty="0"/>
               <a:t>SVC</a:t>
             </a:r>
+          </a:p>
+          <a:p>
+            <a:pPr lvl="1"/>
+            <a:r>
+              <a:rPr lang="en-US" dirty="0"/>
+              <a:t>KNN</a:t>
+            </a:r>
+          </a:p>
+          <a:p>
+            <a:pPr lvl="1"/>
+            <a:endParaRPr lang="en-US" dirty="0"/>
           </a:p>
         </p:txBody>
       </p:sp>
@@ -5855,14 +5746,14 @@
             <p:ph sz="half" idx="2"/>
             <p:extLst>
               <p:ext uri="{D42A27DB-BD31-4B8C-83A1-F6EECF244321}">
-                <p14:modId xmlns:p14="http://schemas.microsoft.com/office/powerpoint/2010/main" val="4040356590"/>
+                <p14:modId xmlns:p14="http://schemas.microsoft.com/office/powerpoint/2010/main" val="935534714"/>
               </p:ext>
             </p:extLst>
           </p:nvPr>
         </p:nvGraphicFramePr>
         <p:xfrm>
-          <a:off x="4800601" y="1934953"/>
-          <a:ext cx="6346370" cy="4106440"/>
+          <a:off x="2466363" y="1895912"/>
+          <a:ext cx="9311780" cy="4105975"/>
         </p:xfrm>
         <a:graphic>
           <a:graphicData uri="http://schemas.openxmlformats.org/drawingml/2006/table">
@@ -5871,14 +5762,14 @@
                 <a:tableStyleId>{5C22544A-7EE6-4342-B048-85BDC9FD1C3A}</a:tableStyleId>
               </a:tblPr>
               <a:tblGrid>
-                <a:gridCol w="1780242">
+                <a:gridCol w="2612079">
                   <a:extLst>
                     <a:ext uri="{9D8B030D-6E8A-4147-A177-3AD203B41FA5}">
                       <a16:colId xmlns:a16="http://schemas.microsoft.com/office/drawing/2014/main" val="4146244293"/>
                     </a:ext>
                   </a:extLst>
                 </a:gridCol>
-                <a:gridCol w="4566128">
+                <a:gridCol w="6699701">
                   <a:extLst>
                     <a:ext uri="{9D8B030D-6E8A-4147-A177-3AD203B41FA5}">
                       <a16:colId xmlns:a16="http://schemas.microsoft.com/office/drawing/2014/main" val="3058098281"/>
@@ -5886,7 +5777,7 @@
                   </a:extLst>
                 </a:gridCol>
               </a:tblGrid>
-              <a:tr h="564418">
+              <a:tr h="570295">
                 <a:tc>
                   <a:txBody>
                     <a:bodyPr/>
@@ -5926,7 +5817,7 @@
                   </a:ext>
                 </a:extLst>
               </a:tr>
-              <a:tr h="825074">
+              <a:tr h="779731">
                 <a:tc>
                   <a:txBody>
                     <a:bodyPr/>
@@ -5982,7 +5873,7 @@
                   </a:ext>
                 </a:extLst>
               </a:tr>
-              <a:tr h="825074">
+              <a:tr h="779731">
                 <a:tc>
                   <a:txBody>
                     <a:bodyPr/>
@@ -6038,7 +5929,7 @@
                   </a:ext>
                 </a:extLst>
               </a:tr>
-              <a:tr h="825074">
+              <a:tr h="1008172">
                 <a:tc>
                   <a:txBody>
                     <a:bodyPr/>
@@ -6102,7 +5993,7 @@
                   </a:ext>
                 </a:extLst>
               </a:tr>
-              <a:tr h="825074">
+              <a:tr h="779731">
                 <a:tc>
                   <a:txBody>
                     <a:bodyPr/>
@@ -6165,7 +6056,7 @@
     </p:spTree>
     <p:extLst>
       <p:ext uri="{BB962C8B-B14F-4D97-AF65-F5344CB8AC3E}">
-        <p14:creationId xmlns:p14="http://schemas.microsoft.com/office/powerpoint/2010/main" val="2958221780"/>
+        <p14:creationId xmlns:p14="http://schemas.microsoft.com/office/powerpoint/2010/main" val="761589380"/>
       </p:ext>
     </p:extLst>
   </p:cSld>
@@ -6175,7 +6066,7 @@
 </p:sld>
 </file>
 
-<file path=ppt/slides/slide7.xml><?xml version="1.0" encoding="utf-8"?>
+<file path=ppt/slides/slide8.xml><?xml version="1.0" encoding="utf-8"?>
 <p:sld xmlns:a="http://schemas.openxmlformats.org/drawingml/2006/main" xmlns:r="http://schemas.openxmlformats.org/officeDocument/2006/relationships" xmlns:p="http://schemas.openxmlformats.org/presentationml/2006/main">
   <p:cSld>
     <p:spTree>
@@ -6398,7 +6289,7 @@
 </p:sld>
 </file>
 
-<file path=ppt/slides/slide8.xml><?xml version="1.0" encoding="utf-8"?>
+<file path=ppt/slides/slide9.xml><?xml version="1.0" encoding="utf-8"?>
 <p:sld xmlns:a="http://schemas.openxmlformats.org/drawingml/2006/main" xmlns:r="http://schemas.openxmlformats.org/officeDocument/2006/relationships" xmlns:p="http://schemas.openxmlformats.org/presentationml/2006/main">
   <p:cSld>
     <p:spTree>
@@ -6420,7 +6311,7 @@
           <p:cNvPr id="2" name="Title 1">
             <a:extLst>
               <a:ext uri="{FF2B5EF4-FFF2-40B4-BE49-F238E27FC236}">
-                <a16:creationId xmlns:a16="http://schemas.microsoft.com/office/drawing/2014/main" id="{80F0CDE1-B507-D437-02EF-687206CE56EE}"/>
+                <a16:creationId xmlns:a16="http://schemas.microsoft.com/office/drawing/2014/main" id="{C1B193E0-939D-A606-2628-03ADAC4D113A}"/>
               </a:ext>
             </a:extLst>
           </p:cNvPr>
@@ -6438,8 +6329,54 @@
           <a:p>
             <a:r>
               <a:rPr lang="en-US" dirty="0"/>
-              <a:t>Demo</a:t>
-            </a:r>
+              <a:t>Next steps </a:t>
+            </a:r>
+          </a:p>
+        </p:txBody>
+      </p:sp>
+      <p:sp>
+        <p:nvSpPr>
+          <p:cNvPr id="3" name="Content Placeholder 2">
+            <a:extLst>
+              <a:ext uri="{FF2B5EF4-FFF2-40B4-BE49-F238E27FC236}">
+                <a16:creationId xmlns:a16="http://schemas.microsoft.com/office/drawing/2014/main" id="{3D7814A2-E219-05AF-61F3-3B1BE966D6D9}"/>
+              </a:ext>
+            </a:extLst>
+          </p:cNvPr>
+          <p:cNvSpPr>
+            <a:spLocks noGrp="1"/>
+          </p:cNvSpPr>
+          <p:nvPr>
+            <p:ph sz="half" idx="1"/>
+          </p:nvPr>
+        </p:nvSpPr>
+        <p:spPr>
+          <a:xfrm>
+            <a:off x="828649" y="2136103"/>
+            <a:ext cx="4645152" cy="3448595"/>
+          </a:xfrm>
+        </p:spPr>
+        <p:txBody>
+          <a:bodyPr>
+            <a:normAutofit/>
+          </a:bodyPr>
+          <a:lstStyle/>
+          <a:p>
+            <a:pPr algn="ctr"/>
+            <a:r>
+              <a:rPr lang="en-US" sz="2000" b="1" dirty="0"/>
+              <a:t>DEMO</a:t>
+            </a:r>
+            <a:endParaRPr lang="en-US" b="1" dirty="0"/>
+          </a:p>
+          <a:p>
+            <a:endParaRPr lang="en-US" dirty="0"/>
+          </a:p>
+          <a:p>
+            <a:endParaRPr lang="en-US" dirty="0"/>
+          </a:p>
+          <a:p>
+            <a:endParaRPr lang="en-US" dirty="0"/>
           </a:p>
         </p:txBody>
       </p:sp>
@@ -6448,7 +6385,7 @@
           <p:cNvPr id="4" name="Content Placeholder 3">
             <a:extLst>
               <a:ext uri="{FF2B5EF4-FFF2-40B4-BE49-F238E27FC236}">
-                <a16:creationId xmlns:a16="http://schemas.microsoft.com/office/drawing/2014/main" id="{FBFAE4F4-6D77-E64D-B32F-3B861857DC91}"/>
+                <a16:creationId xmlns:a16="http://schemas.microsoft.com/office/drawing/2014/main" id="{91D929E9-2A0B-1F83-C35E-81C42FF6A513}"/>
               </a:ext>
             </a:extLst>
           </p:cNvPr>
@@ -6459,35 +6396,39 @@
             <p:ph sz="half" idx="2"/>
           </p:nvPr>
         </p:nvSpPr>
-        <p:spPr>
-          <a:xfrm>
-            <a:off x="1449217" y="2017343"/>
-            <a:ext cx="9609706" cy="3441520"/>
-          </a:xfrm>
-        </p:spPr>
+        <p:spPr/>
         <p:txBody>
           <a:bodyPr>
             <a:normAutofit/>
           </a:bodyPr>
           <a:lstStyle/>
           <a:p>
-            <a:pPr marL="0" indent="0" algn="ctr">
-              <a:lnSpc>
-                <a:spcPct val="200000"/>
-              </a:lnSpc>
-              <a:buNone/>
-            </a:pPr>
-            <a:r>
-              <a:rPr lang="en-US" sz="4400" b="1" dirty="0"/>
-              <a:t>THANK YOU </a:t>
-            </a:r>
+            <a:r>
+              <a:rPr lang="en-US" dirty="0"/>
+              <a:t>Model Drift and Monitoring to train the model.</a:t>
+            </a:r>
+          </a:p>
+          <a:p>
+            <a:r>
+              <a:rPr lang="en-US" dirty="0"/>
+              <a:t>Model can self-learn to predict more disease types provided additional training data.</a:t>
+            </a:r>
+          </a:p>
+          <a:p>
+            <a:r>
+              <a:rPr lang="en-US" dirty="0"/>
+              <a:t>Rest APIs are provided for easy integration with external systems to use the prediction results.</a:t>
+            </a:r>
+          </a:p>
+          <a:p>
+            <a:endParaRPr lang="en-US" dirty="0"/>
           </a:p>
         </p:txBody>
       </p:sp>
     </p:spTree>
     <p:extLst>
       <p:ext uri="{BB962C8B-B14F-4D97-AF65-F5344CB8AC3E}">
-        <p14:creationId xmlns:p14="http://schemas.microsoft.com/office/powerpoint/2010/main" val="2814617537"/>
+        <p14:creationId xmlns:p14="http://schemas.microsoft.com/office/powerpoint/2010/main" val="3960331832"/>
       </p:ext>
     </p:extLst>
   </p:cSld>

</xml_diff>

<commit_message>
Changes to the slides
</commit_message>
<xml_diff>
--- a/Team 5 - Project 2 - Presentation.pptx
+++ b/Team 5 - Project 2 - Presentation.pptx
@@ -8,7 +8,7 @@
     <p:sldId id="256" r:id="rId2"/>
     <p:sldId id="257" r:id="rId3"/>
     <p:sldId id="266" r:id="rId4"/>
-    <p:sldId id="265" r:id="rId5"/>
+    <p:sldId id="271" r:id="rId5"/>
     <p:sldId id="258" r:id="rId6"/>
     <p:sldId id="259" r:id="rId7"/>
     <p:sldId id="269" r:id="rId8"/>
@@ -273,7 +273,7 @@
           <a:p>
             <a:fld id="{48A87A34-81AB-432B-8DAE-1953F412C126}" type="datetimeFigureOut">
               <a:rPr lang="en-US" dirty="0"/>
-              <a:t>7/8/24</a:t>
+              <a:t>7/9/24</a:t>
             </a:fld>
             <a:endParaRPr lang="en-US" dirty="0"/>
           </a:p>
@@ -479,7 +479,7 @@
           <a:p>
             <a:fld id="{48A87A34-81AB-432B-8DAE-1953F412C126}" type="datetimeFigureOut">
               <a:rPr lang="en-US" dirty="0"/>
-              <a:t>7/8/24</a:t>
+              <a:t>7/9/24</a:t>
             </a:fld>
             <a:endParaRPr lang="en-US" dirty="0"/>
           </a:p>
@@ -689,7 +689,7 @@
           <a:p>
             <a:fld id="{48A87A34-81AB-432B-8DAE-1953F412C126}" type="datetimeFigureOut">
               <a:rPr lang="en-US" dirty="0"/>
-              <a:t>7/8/24</a:t>
+              <a:t>7/9/24</a:t>
             </a:fld>
             <a:endParaRPr lang="en-US" dirty="0"/>
           </a:p>
@@ -885,7 +885,7 @@
           <a:p>
             <a:fld id="{48A87A34-81AB-432B-8DAE-1953F412C126}" type="datetimeFigureOut">
               <a:rPr lang="en-US" dirty="0"/>
-              <a:t>7/8/24</a:t>
+              <a:t>7/9/24</a:t>
             </a:fld>
             <a:endParaRPr lang="en-US" dirty="0"/>
           </a:p>
@@ -1159,7 +1159,7 @@
           <a:p>
             <a:fld id="{48A87A34-81AB-432B-8DAE-1953F412C126}" type="datetimeFigureOut">
               <a:rPr lang="en-US" dirty="0"/>
-              <a:t>7/8/24</a:t>
+              <a:t>7/9/24</a:t>
             </a:fld>
             <a:endParaRPr lang="en-US" dirty="0"/>
           </a:p>
@@ -1422,7 +1422,7 @@
           <a:p>
             <a:fld id="{48A87A34-81AB-432B-8DAE-1953F412C126}" type="datetimeFigureOut">
               <a:rPr lang="en-US" dirty="0"/>
-              <a:t>7/8/24</a:t>
+              <a:t>7/9/24</a:t>
             </a:fld>
             <a:endParaRPr lang="en-US" dirty="0"/>
           </a:p>
@@ -1833,7 +1833,7 @@
           <a:p>
             <a:fld id="{48A87A34-81AB-432B-8DAE-1953F412C126}" type="datetimeFigureOut">
               <a:rPr lang="en-US" dirty="0"/>
-              <a:t>7/8/24</a:t>
+              <a:t>7/9/24</a:t>
             </a:fld>
             <a:endParaRPr lang="en-US" dirty="0"/>
           </a:p>
@@ -1977,7 +1977,7 @@
           <a:p>
             <a:fld id="{48A87A34-81AB-432B-8DAE-1953F412C126}" type="datetimeFigureOut">
               <a:rPr lang="en-US" dirty="0"/>
-              <a:t>7/8/24</a:t>
+              <a:t>7/9/24</a:t>
             </a:fld>
             <a:endParaRPr lang="en-US" dirty="0"/>
           </a:p>
@@ -2098,7 +2098,7 @@
           <a:p>
             <a:fld id="{48A87A34-81AB-432B-8DAE-1953F412C126}" type="datetimeFigureOut">
               <a:rPr lang="en-US" dirty="0"/>
-              <a:t>7/8/24</a:t>
+              <a:t>7/9/24</a:t>
             </a:fld>
             <a:endParaRPr lang="en-US" dirty="0"/>
           </a:p>
@@ -2344,7 +2344,7 @@
           <a:p>
             <a:fld id="{48A87A34-81AB-432B-8DAE-1953F412C126}" type="datetimeFigureOut">
               <a:rPr lang="en-US" dirty="0"/>
-              <a:t>7/8/24</a:t>
+              <a:t>7/9/24</a:t>
             </a:fld>
             <a:endParaRPr lang="en-US" dirty="0"/>
           </a:p>
@@ -2785,7 +2785,7 @@
             <a:fld id="{48A87A34-81AB-432B-8DAE-1953F412C126}" type="datetimeFigureOut">
               <a:rPr lang="en-US" dirty="0"/>
               <a:pPr/>
-              <a:t>7/8/24</a:t>
+              <a:t>7/9/24</a:t>
             </a:fld>
             <a:endParaRPr lang="en-US" dirty="0"/>
           </a:p>
@@ -3108,7 +3108,7 @@
             <a:fld id="{48A87A34-81AB-432B-8DAE-1953F412C126}" type="datetimeFigureOut">
               <a:rPr lang="en-US" dirty="0"/>
               <a:pPr/>
-              <a:t>7/8/24</a:t>
+              <a:t>7/9/24</a:t>
             </a:fld>
             <a:endParaRPr lang="en-US" dirty="0"/>
           </a:p>
@@ -4067,7 +4067,7 @@
         </p:spPr>
         <p:txBody>
           <a:bodyPr>
-            <a:normAutofit/>
+            <a:normAutofit fontScale="85000" lnSpcReduction="10000"/>
           </a:bodyPr>
           <a:lstStyle/>
           <a:p>
@@ -4108,7 +4108,7 @@
         <p:spPr/>
         <p:txBody>
           <a:bodyPr>
-            <a:normAutofit/>
+            <a:normAutofit fontScale="85000" lnSpcReduction="10000"/>
           </a:bodyPr>
           <a:lstStyle/>
           <a:p>
@@ -4121,6 +4121,20 @@
             <a:r>
               <a:rPr lang="en-US" dirty="0"/>
               <a:t>Model can self-learn to predict more disease types provided additional training data.</a:t>
+            </a:r>
+          </a:p>
+          <a:p>
+            <a:r>
+              <a:rPr lang="en-US" dirty="0"/>
+              <a:t>Extend the model to provide preliminary treatment  guidance with </a:t>
+            </a:r>
+            <a:r>
+              <a:rPr lang="en-US"/>
+              <a:t>additional feature training </a:t>
+            </a:r>
+            <a:r>
+              <a:rPr lang="en-US" dirty="0"/>
+              <a:t>data</a:t>
             </a:r>
           </a:p>
           <a:p>
@@ -4665,30 +4679,6 @@
 <file path=ppt/slides/slide4.xml><?xml version="1.0" encoding="utf-8"?>
 <p:sld xmlns:a="http://schemas.openxmlformats.org/drawingml/2006/main" xmlns:r="http://schemas.openxmlformats.org/officeDocument/2006/relationships" xmlns:p="http://schemas.openxmlformats.org/presentationml/2006/main">
   <p:cSld>
-    <p:bg>
-      <p:bgPr>
-        <a:gradFill rotWithShape="1">
-          <a:gsLst>
-            <a:gs pos="0">
-              <a:schemeClr val="bg2">
-                <a:tint val="94000"/>
-                <a:satMod val="80000"/>
-                <a:lumMod val="106000"/>
-              </a:schemeClr>
-            </a:gs>
-            <a:gs pos="100000">
-              <a:schemeClr val="bg2">
-                <a:shade val="80000"/>
-              </a:schemeClr>
-            </a:gs>
-          </a:gsLst>
-          <a:path path="circle">
-            <a:fillToRect l="43000" r="43000" b="100000"/>
-          </a:path>
-        </a:gradFill>
-        <a:effectLst/>
-      </p:bgPr>
-    </p:bg>
     <p:spTree>
       <p:nvGrpSpPr>
         <p:cNvPr id="1" name=""/>
@@ -4705,352 +4695,6 @@
       </p:grpSpPr>
       <p:sp>
         <p:nvSpPr>
-          <p:cNvPr id="153" name="Rectangle 152">
-            <a:extLst>
-              <a:ext uri="{FF2B5EF4-FFF2-40B4-BE49-F238E27FC236}">
-                <a16:creationId xmlns:a16="http://schemas.microsoft.com/office/drawing/2014/main" id="{EEA869E1-F851-4A52-92F5-77E592B76A5B}"/>
-              </a:ext>
-              <a:ext uri="{C183D7F6-B498-43B3-948B-1728B52AA6E4}">
-                <adec:decorative xmlns:adec="http://schemas.microsoft.com/office/drawing/2017/decorative" val="1"/>
-              </a:ext>
-            </a:extLst>
-          </p:cNvPr>
-          <p:cNvSpPr>
-            <a:spLocks noGrp="1" noRot="1" noChangeAspect="1" noMove="1" noResize="1" noEditPoints="1" noAdjustHandles="1" noChangeArrowheads="1" noChangeShapeType="1" noTextEdit="1"/>
-          </p:cNvSpPr>
-          <p:nvPr>
-            <p:extLst>
-              <p:ext uri="{386F3935-93C4-4BCD-93E2-E3B085C9AB24}">
-                <p16:designElem xmlns:p16="http://schemas.microsoft.com/office/powerpoint/2015/main" val="1"/>
-              </p:ext>
-            </p:extLst>
-          </p:nvPr>
-        </p:nvSpPr>
-        <p:spPr>
-          <a:xfrm>
-            <a:off x="0" y="2019476"/>
-            <a:ext cx="12192000" cy="4105941"/>
-          </a:xfrm>
-          <a:prstGeom prst="rect">
-            <a:avLst/>
-          </a:prstGeom>
-          <a:gradFill flip="none" rotWithShape="1">
-            <a:gsLst>
-              <a:gs pos="0">
-                <a:schemeClr val="bg2">
-                  <a:alpha val="0"/>
-                </a:schemeClr>
-              </a:gs>
-              <a:gs pos="100000">
-                <a:schemeClr val="bg2"/>
-              </a:gs>
-            </a:gsLst>
-            <a:lin ang="5400000" scaled="0"/>
-            <a:tileRect/>
-          </a:gradFill>
-          <a:ln>
-            <a:noFill/>
-          </a:ln>
-        </p:spPr>
-        <p:style>
-          <a:lnRef idx="2">
-            <a:schemeClr val="accent1">
-              <a:shade val="50000"/>
-            </a:schemeClr>
-          </a:lnRef>
-          <a:fillRef idx="1">
-            <a:schemeClr val="accent1"/>
-          </a:fillRef>
-          <a:effectRef idx="0">
-            <a:schemeClr val="accent1"/>
-          </a:effectRef>
-          <a:fontRef idx="minor">
-            <a:schemeClr val="lt1"/>
-          </a:fontRef>
-        </p:style>
-      </p:sp>
-      <p:pic>
-        <p:nvPicPr>
-          <p:cNvPr id="155" name="Picture 154">
-            <a:extLst>
-              <a:ext uri="{FF2B5EF4-FFF2-40B4-BE49-F238E27FC236}">
-                <a16:creationId xmlns:a16="http://schemas.microsoft.com/office/drawing/2014/main" id="{B083AD55-8296-44BD-8E14-DD2DDBC351B0}"/>
-              </a:ext>
-              <a:ext uri="{C183D7F6-B498-43B3-948B-1728B52AA6E4}">
-                <adec:decorative xmlns:adec="http://schemas.microsoft.com/office/drawing/2017/decorative" val="1"/>
-              </a:ext>
-            </a:extLst>
-          </p:cNvPr>
-          <p:cNvPicPr>
-            <a:picLocks noGrp="1" noRot="1" noChangeAspect="1" noMove="1" noResize="1" noEditPoints="1" noAdjustHandles="1" noChangeArrowheads="1" noChangeShapeType="1" noCrop="1"/>
-          </p:cNvPicPr>
-          <p:nvPr>
-            <p:extLst>
-              <p:ext uri="{386F3935-93C4-4BCD-93E2-E3B085C9AB24}">
-                <p16:designElem xmlns:p16="http://schemas.microsoft.com/office/powerpoint/2015/main" val="1"/>
-              </p:ext>
-            </p:extLst>
-          </p:nvPr>
-        </p:nvPicPr>
-        <p:blipFill rotWithShape="1">
-          <a:blip r:embed="rId2">
-            <a:extLst>
-              <a:ext uri="{28A0092B-C50C-407E-A947-70E740481C1C}">
-                <a14:useLocalDpi xmlns:a14="http://schemas.microsoft.com/office/drawing/2010/main" val="0"/>
-              </a:ext>
-            </a:extLst>
-          </a:blip>
-          <a:srcRect t="1538" b="-1538"/>
-          <a:stretch/>
-        </p:blipFill>
-        <p:spPr bwMode="black">
-          <a:xfrm>
-            <a:off x="0" y="6126480"/>
-            <a:ext cx="12192000" cy="742950"/>
-          </a:xfrm>
-          <a:prstGeom prst="rect">
-            <a:avLst/>
-          </a:prstGeom>
-        </p:spPr>
-      </p:pic>
-      <p:cxnSp>
-        <p:nvCxnSpPr>
-          <p:cNvPr id="157" name="Straight Connector 156">
-            <a:extLst>
-              <a:ext uri="{FF2B5EF4-FFF2-40B4-BE49-F238E27FC236}">
-                <a16:creationId xmlns:a16="http://schemas.microsoft.com/office/drawing/2014/main" id="{2BF46B26-15FC-4C5A-94FA-AE9ED64B5C20}"/>
-              </a:ext>
-              <a:ext uri="{C183D7F6-B498-43B3-948B-1728B52AA6E4}">
-                <adec:decorative xmlns:adec="http://schemas.microsoft.com/office/drawing/2017/decorative" val="1"/>
-              </a:ext>
-            </a:extLst>
-          </p:cNvPr>
-          <p:cNvCxnSpPr>
-            <a:cxnSpLocks noGrp="1" noRot="1" noChangeAspect="1" noMove="1" noResize="1" noEditPoints="1" noAdjustHandles="1" noChangeArrowheads="1" noChangeShapeType="1"/>
-          </p:cNvCxnSpPr>
-          <p:nvPr>
-            <p:extLst>
-              <p:ext uri="{386F3935-93C4-4BCD-93E2-E3B085C9AB24}">
-                <p16:designElem xmlns:p16="http://schemas.microsoft.com/office/powerpoint/2015/main" val="1"/>
-              </p:ext>
-            </p:extLst>
-          </p:nvPr>
-        </p:nvCxnSpPr>
-        <p:spPr>
-          <a:xfrm>
-            <a:off x="0" y="6128413"/>
-            <a:ext cx="12192000" cy="0"/>
-          </a:xfrm>
-          <a:prstGeom prst="line">
-            <a:avLst/>
-          </a:prstGeom>
-          <a:ln w="12700">
-            <a:solidFill>
-              <a:srgbClr val="000001">
-                <a:alpha val="20000"/>
-              </a:srgbClr>
-            </a:solidFill>
-          </a:ln>
-        </p:spPr>
-        <p:style>
-          <a:lnRef idx="1">
-            <a:schemeClr val="accent1"/>
-          </a:lnRef>
-          <a:fillRef idx="0">
-            <a:schemeClr val="accent1"/>
-          </a:fillRef>
-          <a:effectRef idx="0">
-            <a:schemeClr val="accent1"/>
-          </a:effectRef>
-          <a:fontRef idx="minor">
-            <a:schemeClr val="tx1"/>
-          </a:fontRef>
-        </p:style>
-      </p:cxnSp>
-      <p:cxnSp>
-        <p:nvCxnSpPr>
-          <p:cNvPr id="159" name="Straight Connector 158">
-            <a:extLst>
-              <a:ext uri="{FF2B5EF4-FFF2-40B4-BE49-F238E27FC236}">
-                <a16:creationId xmlns:a16="http://schemas.microsoft.com/office/drawing/2014/main" id="{912F6065-5345-44BD-B66E-5487CCD7A9B9}"/>
-              </a:ext>
-              <a:ext uri="{C183D7F6-B498-43B3-948B-1728B52AA6E4}">
-                <adec:decorative xmlns:adec="http://schemas.microsoft.com/office/drawing/2017/decorative" val="1"/>
-              </a:ext>
-            </a:extLst>
-          </p:cNvPr>
-          <p:cNvCxnSpPr>
-            <a:cxnSpLocks noGrp="1" noRot="1" noChangeAspect="1" noMove="1" noResize="1" noEditPoints="1" noAdjustHandles="1" noChangeArrowheads="1" noChangeShapeType="1"/>
-          </p:cNvCxnSpPr>
-          <p:nvPr>
-            <p:extLst>
-              <p:ext uri="{386F3935-93C4-4BCD-93E2-E3B085C9AB24}">
-                <p16:designElem xmlns:p16="http://schemas.microsoft.com/office/powerpoint/2015/main" val="1"/>
-              </p:ext>
-            </p:extLst>
-          </p:nvPr>
-        </p:nvCxnSpPr>
-        <p:spPr>
-          <a:xfrm>
-            <a:off x="2417780" y="3528542"/>
-            <a:ext cx="8637072" cy="0"/>
-          </a:xfrm>
-          <a:prstGeom prst="line">
-            <a:avLst/>
-          </a:prstGeom>
-          <a:ln w="31750"/>
-        </p:spPr>
-        <p:style>
-          <a:lnRef idx="3">
-            <a:schemeClr val="accent1"/>
-          </a:lnRef>
-          <a:fillRef idx="0">
-            <a:schemeClr val="accent1"/>
-          </a:fillRef>
-          <a:effectRef idx="2">
-            <a:schemeClr val="accent1"/>
-          </a:effectRef>
-          <a:fontRef idx="minor">
-            <a:schemeClr val="tx1"/>
-          </a:fontRef>
-        </p:style>
-      </p:cxnSp>
-      <p:sp useBgFill="1">
-        <p:nvSpPr>
-          <p:cNvPr id="161" name="Rectangle 160">
-            <a:extLst>
-              <a:ext uri="{FF2B5EF4-FFF2-40B4-BE49-F238E27FC236}">
-                <a16:creationId xmlns:a16="http://schemas.microsoft.com/office/drawing/2014/main" id="{279E1FA4-890B-4B99-B1AD-AA4B78666B54}"/>
-              </a:ext>
-              <a:ext uri="{C183D7F6-B498-43B3-948B-1728B52AA6E4}">
-                <adec:decorative xmlns:adec="http://schemas.microsoft.com/office/drawing/2017/decorative" val="1"/>
-              </a:ext>
-            </a:extLst>
-          </p:cNvPr>
-          <p:cNvSpPr>
-            <a:spLocks noGrp="1" noRot="1" noChangeAspect="1" noMove="1" noResize="1" noEditPoints="1" noAdjustHandles="1" noChangeArrowheads="1" noChangeShapeType="1" noTextEdit="1"/>
-          </p:cNvSpPr>
-          <p:nvPr>
-            <p:extLst>
-              <p:ext uri="{386F3935-93C4-4BCD-93E2-E3B085C9AB24}">
-                <p16:designElem xmlns:p16="http://schemas.microsoft.com/office/powerpoint/2015/main" val="1"/>
-              </p:ext>
-            </p:extLst>
-          </p:nvPr>
-        </p:nvSpPr>
-        <p:spPr>
-          <a:xfrm>
-            <a:off x="2" y="0"/>
-            <a:ext cx="12191695" cy="6858000"/>
-          </a:xfrm>
-          <a:prstGeom prst="rect">
-            <a:avLst/>
-          </a:prstGeom>
-          <a:ln>
-            <a:noFill/>
-          </a:ln>
-        </p:spPr>
-        <p:style>
-          <a:lnRef idx="2">
-            <a:schemeClr val="accent1">
-              <a:shade val="50000"/>
-            </a:schemeClr>
-          </a:lnRef>
-          <a:fillRef idx="1">
-            <a:schemeClr val="accent1"/>
-          </a:fillRef>
-          <a:effectRef idx="0">
-            <a:schemeClr val="accent1"/>
-          </a:effectRef>
-          <a:fontRef idx="minor">
-            <a:schemeClr val="lt1"/>
-          </a:fontRef>
-        </p:style>
-        <p:txBody>
-          <a:bodyPr rtlCol="0" anchor="ctr"/>
-          <a:lstStyle/>
-          <a:p>
-            <a:pPr algn="ctr"/>
-            <a:endParaRPr lang="en-US"/>
-          </a:p>
-        </p:txBody>
-      </p:sp>
-      <p:sp>
-        <p:nvSpPr>
-          <p:cNvPr id="163" name="Rectangle 162">
-            <a:extLst>
-              <a:ext uri="{FF2B5EF4-FFF2-40B4-BE49-F238E27FC236}">
-                <a16:creationId xmlns:a16="http://schemas.microsoft.com/office/drawing/2014/main" id="{BBEE58B7-C53C-4E7B-A78E-2C44E3E05C59}"/>
-              </a:ext>
-              <a:ext uri="{C183D7F6-B498-43B3-948B-1728B52AA6E4}">
-                <adec:decorative xmlns:adec="http://schemas.microsoft.com/office/drawing/2017/decorative" val="1"/>
-              </a:ext>
-            </a:extLst>
-          </p:cNvPr>
-          <p:cNvSpPr>
-            <a:spLocks noGrp="1" noRot="1" noChangeAspect="1" noMove="1" noResize="1" noEditPoints="1" noAdjustHandles="1" noChangeArrowheads="1" noChangeShapeType="1" noTextEdit="1"/>
-          </p:cNvSpPr>
-          <p:nvPr>
-            <p:extLst>
-              <p:ext uri="{386F3935-93C4-4BCD-93E2-E3B085C9AB24}">
-                <p16:designElem xmlns:p16="http://schemas.microsoft.com/office/powerpoint/2015/main" val="1"/>
-              </p:ext>
-            </p:extLst>
-          </p:nvPr>
-        </p:nvSpPr>
-        <p:spPr>
-          <a:xfrm>
-            <a:off x="0" y="2019476"/>
-            <a:ext cx="12192000" cy="4105941"/>
-          </a:xfrm>
-          <a:prstGeom prst="rect">
-            <a:avLst/>
-          </a:prstGeom>
-          <a:gradFill flip="none" rotWithShape="1">
-            <a:gsLst>
-              <a:gs pos="0">
-                <a:schemeClr val="bg2">
-                  <a:alpha val="0"/>
-                </a:schemeClr>
-              </a:gs>
-              <a:gs pos="100000">
-                <a:schemeClr val="bg2"/>
-              </a:gs>
-            </a:gsLst>
-            <a:lin ang="5400000" scaled="0"/>
-            <a:tileRect/>
-          </a:gradFill>
-          <a:ln>
-            <a:noFill/>
-          </a:ln>
-        </p:spPr>
-        <p:style>
-          <a:lnRef idx="2">
-            <a:schemeClr val="accent1">
-              <a:shade val="50000"/>
-            </a:schemeClr>
-          </a:lnRef>
-          <a:fillRef idx="1">
-            <a:schemeClr val="accent1"/>
-          </a:fillRef>
-          <a:effectRef idx="0">
-            <a:schemeClr val="accent1"/>
-          </a:effectRef>
-          <a:fontRef idx="minor">
-            <a:schemeClr val="lt1"/>
-          </a:fontRef>
-        </p:style>
-        <p:txBody>
-          <a:bodyPr rtlCol="0" anchor="ctr"/>
-          <a:lstStyle/>
-          <a:p>
-            <a:pPr lvl="0" algn="ctr"/>
-            <a:endParaRPr lang="en-US"/>
-          </a:p>
-        </p:txBody>
-      </p:sp>
-      <p:sp>
-        <p:nvSpPr>
           <p:cNvPr id="2" name="Title 1">
             <a:extLst>
               <a:ext uri="{FF2B5EF4-FFF2-40B4-BE49-F238E27FC236}">
@@ -5067,7 +4711,7 @@
         </p:nvSpPr>
         <p:spPr>
           <a:xfrm>
-            <a:off x="1776424" y="4460798"/>
+            <a:off x="504644" y="4810119"/>
             <a:ext cx="8637073" cy="558063"/>
           </a:xfrm>
         </p:spPr>
@@ -5081,268 +4725,6 @@
               <a:rPr lang="en-US" sz="3600"/>
               <a:t>Data Analysis</a:t>
             </a:r>
-          </a:p>
-        </p:txBody>
-      </p:sp>
-      <p:grpSp>
-        <p:nvGrpSpPr>
-          <p:cNvPr id="165" name="Group 164">
-            <a:extLst>
-              <a:ext uri="{FF2B5EF4-FFF2-40B4-BE49-F238E27FC236}">
-                <a16:creationId xmlns:a16="http://schemas.microsoft.com/office/drawing/2014/main" id="{B4BA1F0E-270C-4AB7-809E-DBD5AB89665E}"/>
-              </a:ext>
-              <a:ext uri="{C183D7F6-B498-43B3-948B-1728B52AA6E4}">
-                <adec:decorative xmlns:adec="http://schemas.microsoft.com/office/drawing/2017/decorative" val="1"/>
-              </a:ext>
-            </a:extLst>
-          </p:cNvPr>
-          <p:cNvGrpSpPr>
-            <a:grpSpLocks noGrp="1" noUngrp="1" noRot="1" noChangeAspect="1" noMove="1" noResize="1"/>
-          </p:cNvGrpSpPr>
-          <p:nvPr>
-            <p:extLst>
-              <p:ext uri="{386F3935-93C4-4BCD-93E2-E3B085C9AB24}">
-                <p16:designElem xmlns:p16="http://schemas.microsoft.com/office/powerpoint/2015/main" val="1"/>
-              </p:ext>
-            </p:extLst>
-          </p:nvPr>
-        </p:nvGrpSpPr>
-        <p:grpSpPr>
-          <a:xfrm>
-            <a:off x="1764906" y="323838"/>
-            <a:ext cx="8661501" cy="3652791"/>
-            <a:chOff x="7773058" y="600024"/>
-            <a:chExt cx="3630912" cy="5222486"/>
-          </a:xfrm>
-        </p:grpSpPr>
-        <p:sp>
-          <p:nvSpPr>
-            <p:cNvPr id="166" name="Rectangle 165">
-              <a:extLst>
-                <a:ext uri="{FF2B5EF4-FFF2-40B4-BE49-F238E27FC236}">
-                  <a16:creationId xmlns:a16="http://schemas.microsoft.com/office/drawing/2014/main" id="{F753DA19-3231-4BF9-80B9-6200D23676FE}"/>
-                </a:ext>
-                <a:ext uri="{C183D7F6-B498-43B3-948B-1728B52AA6E4}">
-                  <adec:decorative xmlns:adec="http://schemas.microsoft.com/office/drawing/2017/decorative" val="1"/>
-                </a:ext>
-              </a:extLst>
-            </p:cNvPr>
-            <p:cNvSpPr/>
-            <p:nvPr>
-              <p:extLst>
-                <p:ext uri="{386F3935-93C4-4BCD-93E2-E3B085C9AB24}">
-                  <p16:designElem xmlns:p16="http://schemas.microsoft.com/office/powerpoint/2015/main" val="1"/>
-                </p:ext>
-              </p:extLst>
-            </p:nvPr>
-          </p:nvSpPr>
-          <p:spPr>
-            <a:xfrm>
-              <a:off x="7773058" y="600024"/>
-              <a:ext cx="3630912" cy="5222486"/>
-            </a:xfrm>
-            <a:prstGeom prst="rect">
-              <a:avLst/>
-            </a:prstGeom>
-            <a:gradFill>
-              <a:gsLst>
-                <a:gs pos="0">
-                  <a:srgbClr val="000001"/>
-                </a:gs>
-                <a:gs pos="100000">
-                  <a:srgbClr val="191919"/>
-                </a:gs>
-              </a:gsLst>
-            </a:gradFill>
-            <a:ln w="76200" cmpd="sng">
-              <a:noFill/>
-              <a:miter lim="800000"/>
-            </a:ln>
-            <a:effectLst>
-              <a:outerShdw blurRad="127000" dist="228600" dir="4740000" sx="98000" sy="98000" algn="tl" rotWithShape="0">
-                <a:srgbClr val="000000">
-                  <a:alpha val="34000"/>
-                </a:srgbClr>
-              </a:outerShdw>
-            </a:effectLst>
-            <a:scene3d>
-              <a:camera prst="orthographicFront"/>
-              <a:lightRig rig="threePt" dir="t"/>
-            </a:scene3d>
-            <a:sp3d>
-              <a:bevelT w="152400" h="50800" prst="softRound"/>
-            </a:sp3d>
-          </p:spPr>
-          <p:style>
-            <a:lnRef idx="1">
-              <a:schemeClr val="accent1"/>
-            </a:lnRef>
-            <a:fillRef idx="3">
-              <a:schemeClr val="accent1"/>
-            </a:fillRef>
-            <a:effectRef idx="2">
-              <a:schemeClr val="accent1"/>
-            </a:effectRef>
-            <a:fontRef idx="minor">
-              <a:schemeClr val="lt1"/>
-            </a:fontRef>
-          </p:style>
-          <p:txBody>
-            <a:bodyPr rtlCol="0" anchor="ctr"/>
-            <a:lstStyle/>
-            <a:p>
-              <a:pPr algn="ctr"/>
-              <a:endParaRPr lang="en-US"/>
-            </a:p>
-          </p:txBody>
-        </p:sp>
-        <p:sp>
-          <p:nvSpPr>
-            <p:cNvPr id="167" name="Rectangle 166">
-              <a:extLst>
-                <a:ext uri="{FF2B5EF4-FFF2-40B4-BE49-F238E27FC236}">
-                  <a16:creationId xmlns:a16="http://schemas.microsoft.com/office/drawing/2014/main" id="{241F8506-51A0-4CD0-889F-826E9E678210}"/>
-                </a:ext>
-                <a:ext uri="{C183D7F6-B498-43B3-948B-1728B52AA6E4}">
-                  <adec:decorative xmlns:adec="http://schemas.microsoft.com/office/drawing/2017/decorative" val="1"/>
-                </a:ext>
-              </a:extLst>
-            </p:cNvPr>
-            <p:cNvSpPr/>
-            <p:nvPr>
-              <p:extLst>
-                <p:ext uri="{386F3935-93C4-4BCD-93E2-E3B085C9AB24}">
-                  <p16:designElem xmlns:p16="http://schemas.microsoft.com/office/powerpoint/2015/main" val="1"/>
-                </p:ext>
-              </p:extLst>
-            </p:nvPr>
-          </p:nvSpPr>
-          <p:spPr>
-            <a:xfrm>
-              <a:off x="7904482" y="1062693"/>
-              <a:ext cx="3367301" cy="4292341"/>
-            </a:xfrm>
-            <a:prstGeom prst="rect">
-              <a:avLst/>
-            </a:prstGeom>
-            <a:gradFill>
-              <a:gsLst>
-                <a:gs pos="0">
-                  <a:srgbClr val="DADADA"/>
-                </a:gs>
-                <a:gs pos="100000">
-                  <a:srgbClr val="FFFFFE"/>
-                </a:gs>
-              </a:gsLst>
-              <a:lin ang="16200000" scaled="0"/>
-            </a:gradFill>
-            <a:ln w="50800" cmpd="sng">
-              <a:solidFill>
-                <a:srgbClr val="191919"/>
-              </a:solidFill>
-              <a:miter lim="800000"/>
-            </a:ln>
-            <a:effectLst>
-              <a:innerShdw blurRad="63500" dist="88900" dir="14100000">
-                <a:srgbClr val="000000">
-                  <a:alpha val="30000"/>
-                </a:srgbClr>
-              </a:innerShdw>
-            </a:effectLst>
-            <a:scene3d>
-              <a:camera prst="orthographicFront"/>
-              <a:lightRig rig="threePt" dir="t"/>
-            </a:scene3d>
-            <a:sp3d>
-              <a:bevelT prst="relaxedInset"/>
-            </a:sp3d>
-          </p:spPr>
-          <p:style>
-            <a:lnRef idx="1">
-              <a:schemeClr val="accent1"/>
-            </a:lnRef>
-            <a:fillRef idx="3">
-              <a:schemeClr val="accent1"/>
-            </a:fillRef>
-            <a:effectRef idx="2">
-              <a:schemeClr val="accent1"/>
-            </a:effectRef>
-            <a:fontRef idx="minor">
-              <a:schemeClr val="lt1"/>
-            </a:fontRef>
-          </p:style>
-          <p:txBody>
-            <a:bodyPr rtlCol="0" anchor="ctr"/>
-            <a:lstStyle/>
-            <a:p>
-              <a:pPr algn="ctr"/>
-              <a:endParaRPr lang="en-US"/>
-            </a:p>
-          </p:txBody>
-        </p:sp>
-      </p:grpSp>
-      <p:sp>
-        <p:nvSpPr>
-          <p:cNvPr id="169" name="Rectangle 168">
-            <a:extLst>
-              <a:ext uri="{FF2B5EF4-FFF2-40B4-BE49-F238E27FC236}">
-                <a16:creationId xmlns:a16="http://schemas.microsoft.com/office/drawing/2014/main" id="{29BCA0E2-0826-4688-8066-477F24371DDD}"/>
-              </a:ext>
-              <a:ext uri="{C183D7F6-B498-43B3-948B-1728B52AA6E4}">
-                <adec:decorative xmlns:adec="http://schemas.microsoft.com/office/drawing/2017/decorative" val="1"/>
-              </a:ext>
-            </a:extLst>
-          </p:cNvPr>
-          <p:cNvSpPr>
-            <a:spLocks noGrp="1" noRot="1" noChangeAspect="1" noMove="1" noResize="1" noEditPoints="1" noAdjustHandles="1" noChangeArrowheads="1" noChangeShapeType="1" noTextEdit="1"/>
-          </p:cNvSpPr>
-          <p:nvPr>
-            <p:extLst>
-              <p:ext uri="{386F3935-93C4-4BCD-93E2-E3B085C9AB24}">
-                <p16:designElem xmlns:p16="http://schemas.microsoft.com/office/powerpoint/2015/main" val="1"/>
-              </p:ext>
-            </p:extLst>
-          </p:nvPr>
-        </p:nvSpPr>
-        <p:spPr>
-          <a:xfrm>
-            <a:off x="2244322" y="822145"/>
-            <a:ext cx="7702878" cy="2662923"/>
-          </a:xfrm>
-          <a:prstGeom prst="rect">
-            <a:avLst/>
-          </a:prstGeom>
-          <a:solidFill>
-            <a:schemeClr val="bg1"/>
-          </a:solidFill>
-          <a:ln w="6350">
-            <a:solidFill>
-              <a:schemeClr val="bg2"/>
-            </a:solidFill>
-          </a:ln>
-        </p:spPr>
-        <p:style>
-          <a:lnRef idx="2">
-            <a:schemeClr val="accent1">
-              <a:shade val="50000"/>
-            </a:schemeClr>
-          </a:lnRef>
-          <a:fillRef idx="1">
-            <a:schemeClr val="accent1"/>
-          </a:fillRef>
-          <a:effectRef idx="0">
-            <a:schemeClr val="accent1"/>
-          </a:effectRef>
-          <a:fontRef idx="minor">
-            <a:schemeClr val="lt1"/>
-          </a:fontRef>
-        </p:style>
-        <p:txBody>
-          <a:bodyPr rtlCol="0" anchor="ctr"/>
-          <a:lstStyle/>
-          <a:p>
-            <a:pPr algn="ctr"/>
-            <a:endParaRPr lang="en-US"/>
           </a:p>
         </p:txBody>
       </p:sp>
@@ -5361,14 +4743,14 @@
           <p:nvPr/>
         </p:nvPicPr>
         <p:blipFill rotWithShape="1">
-          <a:blip r:embed="rId3"/>
+          <a:blip r:embed="rId2"/>
           <a:srcRect l="15622" r="15625" b="3"/>
           <a:stretch/>
         </p:blipFill>
         <p:spPr>
           <a:xfrm>
-            <a:off x="2408470" y="963739"/>
-            <a:ext cx="3599926" cy="2369223"/>
+            <a:off x="504644" y="617901"/>
+            <a:ext cx="5515236" cy="3629748"/>
           </a:xfrm>
           <a:prstGeom prst="rect">
             <a:avLst/>
@@ -5390,52 +4772,107 @@
           <p:nvPr/>
         </p:nvPicPr>
         <p:blipFill rotWithShape="1">
-          <a:blip r:embed="rId4"/>
+          <a:blip r:embed="rId3"/>
           <a:srcRect l="15400" r="18502" b="-2"/>
           <a:stretch/>
         </p:blipFill>
         <p:spPr>
           <a:xfrm>
-            <a:off x="6172121" y="963739"/>
-            <a:ext cx="3599926" cy="2369223"/>
+            <a:off x="6172120" y="617901"/>
+            <a:ext cx="5470002" cy="3599978"/>
           </a:xfrm>
           <a:prstGeom prst="rect">
             <a:avLst/>
           </a:prstGeom>
         </p:spPr>
       </p:pic>
-      <p:cxnSp>
-        <p:nvCxnSpPr>
-          <p:cNvPr id="171" name="Straight Connector 170">
+      <p:sp>
+        <p:nvSpPr>
+          <p:cNvPr id="3" name="TextBox 2">
             <a:extLst>
               <a:ext uri="{FF2B5EF4-FFF2-40B4-BE49-F238E27FC236}">
-                <a16:creationId xmlns:a16="http://schemas.microsoft.com/office/drawing/2014/main" id="{4C3F4B1E-3EAB-415B-825A-464AAF1D7510}"/>
-              </a:ext>
-              <a:ext uri="{C183D7F6-B498-43B3-948B-1728B52AA6E4}">
-                <adec:decorative xmlns:adec="http://schemas.microsoft.com/office/drawing/2017/decorative" val="1"/>
+                <a16:creationId xmlns:a16="http://schemas.microsoft.com/office/drawing/2014/main" id="{A117F20F-8B15-AD28-F35C-238008790A35}"/>
               </a:ext>
             </a:extLst>
           </p:cNvPr>
-          <p:cNvCxnSpPr>
-            <a:cxnSpLocks noGrp="1" noRot="1" noChangeAspect="1" noMove="1" noResize="1" noEditPoints="1" noAdjustHandles="1" noChangeArrowheads="1" noChangeShapeType="1"/>
-          </p:cNvCxnSpPr>
-          <p:nvPr>
-            <p:extLst>
-              <p:ext uri="{386F3935-93C4-4BCD-93E2-E3B085C9AB24}">
-                <p16:designElem xmlns:p16="http://schemas.microsoft.com/office/powerpoint/2015/main" val="1"/>
-              </p:ext>
-            </p:extLst>
-          </p:nvPr>
+          <p:cNvSpPr txBox="1"/>
+          <p:nvPr/>
+        </p:nvSpPr>
+        <p:spPr>
+          <a:xfrm>
+            <a:off x="4298731" y="3878317"/>
+            <a:ext cx="184731" cy="369332"/>
+          </a:xfrm>
+          <a:prstGeom prst="rect">
+            <a:avLst/>
+          </a:prstGeom>
+          <a:noFill/>
+        </p:spPr>
+        <p:txBody>
+          <a:bodyPr wrap="none" rtlCol="0">
+            <a:spAutoFit/>
+          </a:bodyPr>
+          <a:lstStyle/>
+          <a:p>
+            <a:endParaRPr lang="en-US" dirty="0"/>
+          </a:p>
+        </p:txBody>
+      </p:sp>
+      <p:sp>
+        <p:nvSpPr>
+          <p:cNvPr id="4" name="TextBox 3">
+            <a:extLst>
+              <a:ext uri="{FF2B5EF4-FFF2-40B4-BE49-F238E27FC236}">
+                <a16:creationId xmlns:a16="http://schemas.microsoft.com/office/drawing/2014/main" id="{4E8B947B-4444-C2FF-6947-81069C90877C}"/>
+              </a:ext>
+            </a:extLst>
+          </p:cNvPr>
+          <p:cNvSpPr txBox="1"/>
+          <p:nvPr/>
+        </p:nvSpPr>
+        <p:spPr>
+          <a:xfrm>
+            <a:off x="8527290" y="617901"/>
+            <a:ext cx="1469204" cy="215444"/>
+          </a:xfrm>
+          <a:prstGeom prst="rect">
+            <a:avLst/>
+          </a:prstGeom>
+          <a:noFill/>
+        </p:spPr>
+        <p:txBody>
+          <a:bodyPr wrap="square" rtlCol="0">
+            <a:spAutoFit/>
+          </a:bodyPr>
+          <a:lstStyle/>
+          <a:p>
+            <a:r>
+              <a:rPr lang="en-US" sz="800" dirty="0"/>
+              <a:t>Gender Vs Prognosis</a:t>
+            </a:r>
+          </a:p>
+        </p:txBody>
+      </p:sp>
+      <p:cxnSp>
+        <p:nvCxnSpPr>
+          <p:cNvPr id="7" name="Straight Connector 6">
+            <a:extLst>
+              <a:ext uri="{FF2B5EF4-FFF2-40B4-BE49-F238E27FC236}">
+                <a16:creationId xmlns:a16="http://schemas.microsoft.com/office/drawing/2014/main" id="{00E5771C-0B2F-9433-A52D-B481E32539BF}"/>
+              </a:ext>
+            </a:extLst>
+          </p:cNvPr>
+          <p:cNvCxnSpPr/>
+          <p:nvPr/>
         </p:nvCxnSpPr>
         <p:spPr>
           <a:xfrm>
-            <a:off x="1776728" y="5027185"/>
-            <a:ext cx="8643010" cy="0"/>
+            <a:off x="504644" y="4592548"/>
+            <a:ext cx="11137392" cy="0"/>
           </a:xfrm>
           <a:prstGeom prst="line">
             <a:avLst/>
           </a:prstGeom>
-          <a:ln w="31750"/>
         </p:spPr>
         <p:style>
           <a:lnRef idx="3">
@@ -5452,140 +4889,10 @@
           </a:fontRef>
         </p:style>
       </p:cxnSp>
-      <p:pic>
-        <p:nvPicPr>
-          <p:cNvPr id="173" name="Picture 172">
-            <a:extLst>
-              <a:ext uri="{FF2B5EF4-FFF2-40B4-BE49-F238E27FC236}">
-                <a16:creationId xmlns:a16="http://schemas.microsoft.com/office/drawing/2014/main" id="{6B708961-E777-4956-A983-78A4F532F460}"/>
-              </a:ext>
-              <a:ext uri="{C183D7F6-B498-43B3-948B-1728B52AA6E4}">
-                <adec:decorative xmlns:adec="http://schemas.microsoft.com/office/drawing/2017/decorative" val="1"/>
-              </a:ext>
-            </a:extLst>
-          </p:cNvPr>
-          <p:cNvPicPr>
-            <a:picLocks noGrp="1" noRot="1" noChangeAspect="1" noMove="1" noResize="1" noEditPoints="1" noAdjustHandles="1" noChangeArrowheads="1" noChangeShapeType="1" noCrop="1"/>
-          </p:cNvPicPr>
-          <p:nvPr>
-            <p:extLst>
-              <p:ext uri="{386F3935-93C4-4BCD-93E2-E3B085C9AB24}">
-                <p16:designElem xmlns:p16="http://schemas.microsoft.com/office/powerpoint/2015/main" val="1"/>
-              </p:ext>
-            </p:extLst>
-          </p:nvPr>
-        </p:nvPicPr>
-        <p:blipFill rotWithShape="1">
-          <a:blip r:embed="rId2">
-            <a:extLst>
-              <a:ext uri="{28A0092B-C50C-407E-A947-70E740481C1C}">
-                <a14:useLocalDpi xmlns:a14="http://schemas.microsoft.com/office/drawing/2010/main" val="0"/>
-              </a:ext>
-            </a:extLst>
-          </a:blip>
-          <a:srcRect t="1538" b="-1538"/>
-          <a:stretch/>
-        </p:blipFill>
-        <p:spPr bwMode="black">
-          <a:xfrm>
-            <a:off x="0" y="6126480"/>
-            <a:ext cx="12192000" cy="742950"/>
-          </a:xfrm>
-          <a:prstGeom prst="rect">
-            <a:avLst/>
-          </a:prstGeom>
-        </p:spPr>
-      </p:pic>
-      <p:cxnSp>
-        <p:nvCxnSpPr>
-          <p:cNvPr id="175" name="Straight Connector 174">
-            <a:extLst>
-              <a:ext uri="{FF2B5EF4-FFF2-40B4-BE49-F238E27FC236}">
-                <a16:creationId xmlns:a16="http://schemas.microsoft.com/office/drawing/2014/main" id="{59D3B50E-372C-47D8-BC90-104318AD8B8F}"/>
-              </a:ext>
-              <a:ext uri="{C183D7F6-B498-43B3-948B-1728B52AA6E4}">
-                <adec:decorative xmlns:adec="http://schemas.microsoft.com/office/drawing/2017/decorative" val="1"/>
-              </a:ext>
-            </a:extLst>
-          </p:cNvPr>
-          <p:cNvCxnSpPr>
-            <a:cxnSpLocks noGrp="1" noRot="1" noChangeAspect="1" noMove="1" noResize="1" noEditPoints="1" noAdjustHandles="1" noChangeArrowheads="1" noChangeShapeType="1"/>
-          </p:cNvCxnSpPr>
-          <p:nvPr>
-            <p:extLst>
-              <p:ext uri="{386F3935-93C4-4BCD-93E2-E3B085C9AB24}">
-                <p16:designElem xmlns:p16="http://schemas.microsoft.com/office/powerpoint/2015/main" val="1"/>
-              </p:ext>
-            </p:extLst>
-          </p:nvPr>
-        </p:nvCxnSpPr>
-        <p:spPr>
-          <a:xfrm>
-            <a:off x="0" y="6128413"/>
-            <a:ext cx="12192000" cy="0"/>
-          </a:xfrm>
-          <a:prstGeom prst="line">
-            <a:avLst/>
-          </a:prstGeom>
-          <a:ln w="12700">
-            <a:solidFill>
-              <a:srgbClr val="000001">
-                <a:alpha val="20000"/>
-              </a:srgbClr>
-            </a:solidFill>
-          </a:ln>
-        </p:spPr>
-        <p:style>
-          <a:lnRef idx="1">
-            <a:schemeClr val="accent1"/>
-          </a:lnRef>
-          <a:fillRef idx="0">
-            <a:schemeClr val="accent1"/>
-          </a:fillRef>
-          <a:effectRef idx="0">
-            <a:schemeClr val="accent1"/>
-          </a:effectRef>
-          <a:fontRef idx="minor">
-            <a:schemeClr val="tx1"/>
-          </a:fontRef>
-        </p:style>
-      </p:cxnSp>
-      <p:sp>
-        <p:nvSpPr>
-          <p:cNvPr id="3" name="TextBox 2">
-            <a:extLst>
-              <a:ext uri="{FF2B5EF4-FFF2-40B4-BE49-F238E27FC236}">
-                <a16:creationId xmlns:a16="http://schemas.microsoft.com/office/drawing/2014/main" id="{A117F20F-8B15-AD28-F35C-238008790A35}"/>
-              </a:ext>
-            </a:extLst>
-          </p:cNvPr>
-          <p:cNvSpPr txBox="1"/>
-          <p:nvPr/>
-        </p:nvSpPr>
-        <p:spPr>
-          <a:xfrm>
-            <a:off x="4298731" y="3878317"/>
-            <a:ext cx="184731" cy="369332"/>
-          </a:xfrm>
-          <a:prstGeom prst="rect">
-            <a:avLst/>
-          </a:prstGeom>
-          <a:noFill/>
-        </p:spPr>
-        <p:txBody>
-          <a:bodyPr wrap="none" rtlCol="0">
-            <a:spAutoFit/>
-          </a:bodyPr>
-          <a:lstStyle/>
-          <a:p>
-            <a:endParaRPr lang="en-US" dirty="0"/>
-          </a:p>
-        </p:txBody>
-      </p:sp>
     </p:spTree>
     <p:extLst>
       <p:ext uri="{BB962C8B-B14F-4D97-AF65-F5344CB8AC3E}">
-        <p14:creationId xmlns:p14="http://schemas.microsoft.com/office/powerpoint/2010/main" val="3535180862"/>
+        <p14:creationId xmlns:p14="http://schemas.microsoft.com/office/powerpoint/2010/main" val="300207062"/>
       </p:ext>
     </p:extLst>
   </p:cSld>
@@ -5813,13 +5120,13 @@
           <a:p>
             <a:r>
               <a:rPr lang="en-US" dirty="0"/>
-              <a:t>Target Value # Disease Type</a:t>
+              <a:t>Target Value # Prognosis Type</a:t>
             </a:r>
           </a:p>
           <a:p>
             <a:r>
               <a:rPr lang="en-US" dirty="0"/>
-              <a:t>Total Number of unique Disease # 44</a:t>
+              <a:t>Total Number of unique Prognosis # 44</a:t>
             </a:r>
           </a:p>
           <a:p>

</xml_diff>